<commit_message>
Hoan thanh bai 2 , cap nhat bai 1
</commit_message>
<xml_diff>
--- a/Bài 1/LATEX CƠ BẢN - Bài 1.pptx
+++ b/Bài 1/LATEX CƠ BẢN - Bài 1.pptx
@@ -20,15 +20,16 @@
     <p:sldId id="267" r:id="rId14"/>
     <p:sldId id="274" r:id="rId15"/>
     <p:sldId id="268" r:id="rId16"/>
-    <p:sldId id="270" r:id="rId17"/>
-    <p:sldId id="271" r:id="rId18"/>
-    <p:sldId id="277" r:id="rId19"/>
-    <p:sldId id="272" r:id="rId20"/>
-    <p:sldId id="278" r:id="rId21"/>
-    <p:sldId id="273" r:id="rId22"/>
-    <p:sldId id="279" r:id="rId23"/>
-    <p:sldId id="281" r:id="rId24"/>
-    <p:sldId id="280" r:id="rId25"/>
+    <p:sldId id="282" r:id="rId17"/>
+    <p:sldId id="270" r:id="rId18"/>
+    <p:sldId id="271" r:id="rId19"/>
+    <p:sldId id="277" r:id="rId20"/>
+    <p:sldId id="272" r:id="rId21"/>
+    <p:sldId id="278" r:id="rId22"/>
+    <p:sldId id="273" r:id="rId23"/>
+    <p:sldId id="279" r:id="rId24"/>
+    <p:sldId id="281" r:id="rId25"/>
+    <p:sldId id="280" r:id="rId26"/>
   </p:sldIdLst>
   <p:sldSz cx="12192000" cy="6858000"/>
   <p:notesSz cx="6858000" cy="9144000"/>
@@ -127,6 +128,11 @@
       </a:defRPr>
     </a:lvl9pPr>
   </p:defaultTextStyle>
+  <p:extLst>
+    <p:ext uri="{EFAFB233-063F-42B5-8137-9DF3F51BA10A}">
+      <p15:sldGuideLst xmlns:p15="http://schemas.microsoft.com/office/powerpoint/2012/main"/>
+    </p:ext>
+  </p:extLst>
 </p:presentation>
 </file>
 
@@ -852,7 +858,7 @@
           <a:p>
             <a:fld id="{C0F77542-EEBF-4180-89BA-8813A26235EF}" type="datetimeFigureOut">
               <a:rPr lang="vi-VN" smtClean="0"/>
-              <a:t>20/05/2021</a:t>
+              <a:t>21/05/2021</a:t>
             </a:fld>
             <a:endParaRPr lang="vi-VN"/>
           </a:p>
@@ -1103,7 +1109,7 @@
           <a:p>
             <a:fld id="{C0F77542-EEBF-4180-89BA-8813A26235EF}" type="datetimeFigureOut">
               <a:rPr lang="vi-VN" smtClean="0"/>
-              <a:t>20/05/2021</a:t>
+              <a:t>21/05/2021</a:t>
             </a:fld>
             <a:endParaRPr lang="vi-VN"/>
           </a:p>
@@ -1417,7 +1423,7 @@
           <a:p>
             <a:fld id="{C0F77542-EEBF-4180-89BA-8813A26235EF}" type="datetimeFigureOut">
               <a:rPr lang="vi-VN" smtClean="0"/>
-              <a:t>20/05/2021</a:t>
+              <a:t>21/05/2021</a:t>
             </a:fld>
             <a:endParaRPr lang="vi-VN"/>
           </a:p>
@@ -1758,7 +1764,7 @@
           <a:p>
             <a:fld id="{C0F77542-EEBF-4180-89BA-8813A26235EF}" type="datetimeFigureOut">
               <a:rPr lang="vi-VN" smtClean="0"/>
-              <a:t>20/05/2021</a:t>
+              <a:t>21/05/2021</a:t>
             </a:fld>
             <a:endParaRPr lang="vi-VN"/>
           </a:p>
@@ -2072,7 +2078,7 @@
           <a:p>
             <a:fld id="{C0F77542-EEBF-4180-89BA-8813A26235EF}" type="datetimeFigureOut">
               <a:rPr lang="vi-VN" smtClean="0"/>
-              <a:t>20/05/2021</a:t>
+              <a:t>21/05/2021</a:t>
             </a:fld>
             <a:endParaRPr lang="vi-VN"/>
           </a:p>
@@ -2465,7 +2471,7 @@
           <a:p>
             <a:fld id="{C0F77542-EEBF-4180-89BA-8813A26235EF}" type="datetimeFigureOut">
               <a:rPr lang="vi-VN" smtClean="0"/>
-              <a:t>20/05/2021</a:t>
+              <a:t>21/05/2021</a:t>
             </a:fld>
             <a:endParaRPr lang="vi-VN"/>
           </a:p>
@@ -2635,7 +2641,7 @@
           <a:p>
             <a:fld id="{C0F77542-EEBF-4180-89BA-8813A26235EF}" type="datetimeFigureOut">
               <a:rPr lang="vi-VN" smtClean="0"/>
-              <a:t>20/05/2021</a:t>
+              <a:t>21/05/2021</a:t>
             </a:fld>
             <a:endParaRPr lang="vi-VN"/>
           </a:p>
@@ -2815,7 +2821,7 @@
           <a:p>
             <a:fld id="{C0F77542-EEBF-4180-89BA-8813A26235EF}" type="datetimeFigureOut">
               <a:rPr lang="vi-VN" smtClean="0"/>
-              <a:t>20/05/2021</a:t>
+              <a:t>21/05/2021</a:t>
             </a:fld>
             <a:endParaRPr lang="vi-VN"/>
           </a:p>
@@ -2991,7 +2997,7 @@
           <a:p>
             <a:fld id="{C0F77542-EEBF-4180-89BA-8813A26235EF}" type="datetimeFigureOut">
               <a:rPr lang="vi-VN" smtClean="0"/>
-              <a:t>20/05/2021</a:t>
+              <a:t>21/05/2021</a:t>
             </a:fld>
             <a:endParaRPr lang="vi-VN"/>
           </a:p>
@@ -3238,7 +3244,7 @@
           <a:p>
             <a:fld id="{C0F77542-EEBF-4180-89BA-8813A26235EF}" type="datetimeFigureOut">
               <a:rPr lang="vi-VN" smtClean="0"/>
-              <a:t>20/05/2021</a:t>
+              <a:t>21/05/2021</a:t>
             </a:fld>
             <a:endParaRPr lang="vi-VN"/>
           </a:p>
@@ -3470,7 +3476,7 @@
           <a:p>
             <a:fld id="{C0F77542-EEBF-4180-89BA-8813A26235EF}" type="datetimeFigureOut">
               <a:rPr lang="vi-VN" smtClean="0"/>
-              <a:t>20/05/2021</a:t>
+              <a:t>21/05/2021</a:t>
             </a:fld>
             <a:endParaRPr lang="vi-VN"/>
           </a:p>
@@ -3844,7 +3850,7 @@
           <a:p>
             <a:fld id="{C0F77542-EEBF-4180-89BA-8813A26235EF}" type="datetimeFigureOut">
               <a:rPr lang="vi-VN" smtClean="0"/>
-              <a:t>20/05/2021</a:t>
+              <a:t>21/05/2021</a:t>
             </a:fld>
             <a:endParaRPr lang="vi-VN"/>
           </a:p>
@@ -3967,7 +3973,7 @@
           <a:p>
             <a:fld id="{C0F77542-EEBF-4180-89BA-8813A26235EF}" type="datetimeFigureOut">
               <a:rPr lang="vi-VN" smtClean="0"/>
-              <a:t>20/05/2021</a:t>
+              <a:t>21/05/2021</a:t>
             </a:fld>
             <a:endParaRPr lang="vi-VN"/>
           </a:p>
@@ -4062,7 +4068,7 @@
           <a:p>
             <a:fld id="{C0F77542-EEBF-4180-89BA-8813A26235EF}" type="datetimeFigureOut">
               <a:rPr lang="vi-VN" smtClean="0"/>
-              <a:t>20/05/2021</a:t>
+              <a:t>21/05/2021</a:t>
             </a:fld>
             <a:endParaRPr lang="vi-VN"/>
           </a:p>
@@ -4317,7 +4323,7 @@
           <a:p>
             <a:fld id="{C0F77542-EEBF-4180-89BA-8813A26235EF}" type="datetimeFigureOut">
               <a:rPr lang="vi-VN" smtClean="0"/>
-              <a:t>20/05/2021</a:t>
+              <a:t>21/05/2021</a:t>
             </a:fld>
             <a:endParaRPr lang="vi-VN"/>
           </a:p>
@@ -4580,7 +4586,7 @@
           <a:p>
             <a:fld id="{C0F77542-EEBF-4180-89BA-8813A26235EF}" type="datetimeFigureOut">
               <a:rPr lang="vi-VN" smtClean="0"/>
-              <a:t>20/05/2021</a:t>
+              <a:t>21/05/2021</a:t>
             </a:fld>
             <a:endParaRPr lang="vi-VN"/>
           </a:p>
@@ -5323,7 +5329,7 @@
           <a:p>
             <a:fld id="{C0F77542-EEBF-4180-89BA-8813A26235EF}" type="datetimeFigureOut">
               <a:rPr lang="vi-VN" smtClean="0"/>
-              <a:t>20/05/2021</a:t>
+              <a:t>21/05/2021</a:t>
             </a:fld>
             <a:endParaRPr lang="vi-VN"/>
           </a:p>
@@ -6659,45 +6665,221 @@
       </p:sp>
       <p:sp>
         <p:nvSpPr>
-          <p:cNvPr id="3" name="Content Placeholder 2"/>
-          <p:cNvSpPr>
-            <a:spLocks noGrp="1"/>
+          <p:cNvPr id="5" name="Rectangle 2"/>
+          <p:cNvSpPr>
+            <a:spLocks noGrp="1" noChangeArrowheads="1"/>
           </p:cNvSpPr>
           <p:nvPr>
             <p:ph idx="1"/>
           </p:nvPr>
         </p:nvSpPr>
-        <p:spPr>
+        <p:spPr bwMode="auto">
           <a:xfrm>
-            <a:off x="793244" y="2289378"/>
-            <a:ext cx="8596668" cy="3880773"/>
+            <a:off x="677334" y="2207504"/>
+            <a:ext cx="9277528" cy="2215991"/>
           </a:xfrm>
+          <a:prstGeom prst="rect">
+            <a:avLst/>
+          </a:prstGeom>
+          <a:solidFill>
+            <a:srgbClr val="FFFFFF"/>
+          </a:solidFill>
+          <a:ln>
+            <a:noFill/>
+          </a:ln>
+          <a:effectLst/>
+          <a:extLst>
+            <a:ext uri="{91240B29-F687-4F45-9708-019B960494DF}">
+              <a14:hiddenLine xmlns:a14="http://schemas.microsoft.com/office/drawing/2010/main" w="9525">
+                <a:solidFill>
+                  <a:schemeClr val="tx1"/>
+                </a:solidFill>
+                <a:miter lim="800000"/>
+                <a:headEnd/>
+                <a:tailEnd/>
+              </a14:hiddenLine>
+            </a:ext>
+            <a:ext uri="{AF507438-7753-43E0-B8FC-AC1667EBCBE1}">
+              <a14:hiddenEffects xmlns:a14="http://schemas.microsoft.com/office/drawing/2010/main">
+                <a:effectLst>
+                  <a:outerShdw dist="35921" dir="2700000" algn="ctr" rotWithShape="0">
+                    <a:schemeClr val="bg2"/>
+                  </a:outerShdw>
+                </a:effectLst>
+              </a14:hiddenEffects>
+            </a:ext>
+          </a:extLst>
         </p:spPr>
         <p:txBody>
-          <a:bodyPr>
-            <a:normAutofit/>
+          <a:bodyPr vert="horz" wrap="square" lIns="0" tIns="0" rIns="0" bIns="0" numCol="1" anchor="ctr" anchorCtr="0" compatLnSpc="1">
+            <a:prstTxWarp prst="textNoShape">
+              <a:avLst/>
+            </a:prstTxWarp>
+            <a:spAutoFit/>
           </a:bodyPr>
           <a:lstStyle/>
           <a:p>
-            <a:r>
-              <a:rPr lang="vi-VN" sz="3600" dirty="0" smtClean="0"/>
-              <a:t>Đầu vào của latex có thể là một tập văn </a:t>
-            </a:r>
-            <a:r>
-              <a:rPr lang="vi-VN" sz="3600" dirty="0"/>
-              <a:t>bản </a:t>
-            </a:r>
-            <a:r>
-              <a:rPr lang="vi-VN" sz="3600" dirty="0" smtClean="0"/>
-              <a:t>ASCII , có thể chứa các lệnh của Latex , khoảng cách , ...</a:t>
-            </a:r>
-          </a:p>
-          <a:p>
-            <a:r>
-              <a:rPr lang="vi-VN" sz="3600" dirty="0" smtClean="0"/>
-              <a:t>Đầu ra thường là .dvi hoặc .pdf</a:t>
-            </a:r>
-            <a:endParaRPr lang="vi-VN" sz="3600" dirty="0"/>
+            <a:pPr defTabSz="914400" eaLnBrk="0" fontAlgn="base" hangingPunct="0">
+              <a:spcBef>
+                <a:spcPct val="0"/>
+              </a:spcBef>
+              <a:spcAft>
+                <a:spcPct val="0"/>
+              </a:spcAft>
+              <a:buSzTx/>
+            </a:pPr>
+            <a:endParaRPr kumimoji="0" lang="vi-VN" altLang="vi-VN" sz="2400" b="0" i="0" u="none" strike="noStrike" cap="none" normalizeH="0" baseline="0" dirty="0" smtClean="0">
+              <a:ln>
+                <a:noFill/>
+              </a:ln>
+              <a:solidFill>
+                <a:schemeClr val="tx1"/>
+              </a:solidFill>
+              <a:effectLst/>
+              <a:latin typeface="Arial" panose="020B0604020202020204" pitchFamily="34" charset="0"/>
+            </a:endParaRPr>
+          </a:p>
+          <a:p>
+            <a:pPr defTabSz="914400" eaLnBrk="0" fontAlgn="base" hangingPunct="0">
+              <a:spcBef>
+                <a:spcPct val="0"/>
+              </a:spcBef>
+              <a:spcAft>
+                <a:spcPct val="0"/>
+              </a:spcAft>
+              <a:buSzTx/>
+            </a:pPr>
+            <a:r>
+              <a:rPr kumimoji="0" lang="vi-VN" altLang="vi-VN" sz="2400" b="1" i="0" u="none" strike="noStrike" cap="none" normalizeH="0" baseline="0" dirty="0" smtClean="0">
+                <a:ln>
+                  <a:noFill/>
+                </a:ln>
+                <a:solidFill>
+                  <a:srgbClr val="333333"/>
+                </a:solidFill>
+                <a:effectLst/>
+                <a:latin typeface="Arial" panose="020B0604020202020204" pitchFamily="34" charset="0"/>
+                <a:cs typeface="Arial" panose="020B0604020202020204" pitchFamily="34" charset="0"/>
+              </a:rPr>
+              <a:t>*.tex</a:t>
+            </a:r>
+            <a:r>
+              <a:rPr kumimoji="0" lang="vi-VN" altLang="vi-VN" sz="2400" b="0" i="0" u="none" strike="noStrike" cap="none" normalizeH="0" baseline="0" dirty="0" smtClean="0">
+                <a:ln>
+                  <a:noFill/>
+                </a:ln>
+                <a:solidFill>
+                  <a:srgbClr val="333333"/>
+                </a:solidFill>
+                <a:effectLst/>
+                <a:latin typeface="Arial" panose="020B0604020202020204" pitchFamily="34" charset="0"/>
+                <a:cs typeface="Arial" panose="020B0604020202020204" pitchFamily="34" charset="0"/>
+              </a:rPr>
+              <a:t> Tập tin nhập liệu của LaTeX (tệp tin nguồn)</a:t>
+            </a:r>
+          </a:p>
+          <a:p>
+            <a:pPr defTabSz="914400" eaLnBrk="0" fontAlgn="base" hangingPunct="0">
+              <a:spcBef>
+                <a:spcPct val="0"/>
+              </a:spcBef>
+              <a:spcAft>
+                <a:spcPct val="0"/>
+              </a:spcAft>
+              <a:buSzTx/>
+            </a:pPr>
+            <a:r>
+              <a:rPr kumimoji="0" lang="vi-VN" altLang="vi-VN" sz="2400" b="1" i="0" u="none" strike="noStrike" cap="none" normalizeH="0" baseline="0" dirty="0" smtClean="0">
+                <a:ln>
+                  <a:noFill/>
+                </a:ln>
+                <a:solidFill>
+                  <a:srgbClr val="333333"/>
+                </a:solidFill>
+                <a:effectLst/>
+                <a:latin typeface="Arial" panose="020B0604020202020204" pitchFamily="34" charset="0"/>
+                <a:cs typeface="Arial" panose="020B0604020202020204" pitchFamily="34" charset="0"/>
+              </a:rPr>
+              <a:t>*.sty</a:t>
+            </a:r>
+            <a:r>
+              <a:rPr kumimoji="0" lang="vi-VN" altLang="vi-VN" sz="2400" b="0" i="0" u="none" strike="noStrike" cap="none" normalizeH="0" baseline="0" dirty="0" smtClean="0">
+                <a:ln>
+                  <a:noFill/>
+                </a:ln>
+                <a:solidFill>
+                  <a:srgbClr val="333333"/>
+                </a:solidFill>
+                <a:effectLst/>
+                <a:latin typeface="Arial" panose="020B0604020202020204" pitchFamily="34" charset="0"/>
+                <a:cs typeface="Arial" panose="020B0604020202020204" pitchFamily="34" charset="0"/>
+              </a:rPr>
+              <a:t> Gói lệnh thêm vào cho LaTeX. Nó là một tập tin riêng lẽ và bạn có thể kết hợp nó vào tập tin tài liệu của bạn bằng cách sử dụng lệnh </a:t>
+            </a:r>
+            <a:r>
+              <a:rPr kumimoji="0" lang="vi-VN" altLang="vi-VN" sz="2400" b="0" i="0" u="none" strike="noStrike" cap="none" normalizeH="0" baseline="0" dirty="0" smtClean="0">
+                <a:ln>
+                  <a:noFill/>
+                </a:ln>
+                <a:solidFill>
+                  <a:srgbClr val="000000"/>
+                </a:solidFill>
+                <a:effectLst/>
+                <a:latin typeface="andale mono"/>
+                <a:cs typeface="Arial" panose="020B0604020202020204" pitchFamily="34" charset="0"/>
+              </a:rPr>
+              <a:t>\usepackage{}</a:t>
+            </a:r>
+            <a:endParaRPr kumimoji="0" lang="vi-VN" altLang="vi-VN" sz="2400" b="0" i="0" u="none" strike="noStrike" cap="none" normalizeH="0" baseline="0" dirty="0" smtClean="0">
+              <a:ln>
+                <a:noFill/>
+              </a:ln>
+              <a:solidFill>
+                <a:srgbClr val="333333"/>
+              </a:solidFill>
+              <a:effectLst/>
+              <a:latin typeface="Arial" panose="020B0604020202020204" pitchFamily="34" charset="0"/>
+              <a:cs typeface="Arial" panose="020B0604020202020204" pitchFamily="34" charset="0"/>
+            </a:endParaRPr>
+          </a:p>
+          <a:p>
+            <a:pPr defTabSz="914400" eaLnBrk="0" fontAlgn="base" hangingPunct="0">
+              <a:spcBef>
+                <a:spcPct val="0"/>
+              </a:spcBef>
+              <a:spcAft>
+                <a:spcPct val="0"/>
+              </a:spcAft>
+              <a:buSzTx/>
+            </a:pPr>
+            <a:r>
+              <a:rPr kumimoji="0" lang="vi-VN" altLang="vi-VN" sz="2400" b="1" i="0" u="none" strike="noStrike" cap="none" normalizeH="0" baseline="0" dirty="0" smtClean="0">
+                <a:ln>
+                  <a:noFill/>
+                </a:ln>
+                <a:solidFill>
+                  <a:srgbClr val="333333"/>
+                </a:solidFill>
+                <a:effectLst/>
+                <a:latin typeface="Arial" panose="020B0604020202020204" pitchFamily="34" charset="0"/>
+                <a:cs typeface="Arial" panose="020B0604020202020204" pitchFamily="34" charset="0"/>
+              </a:rPr>
+              <a:t>*.pdf</a:t>
+            </a:r>
+            <a:r>
+              <a:rPr kumimoji="0" lang="vi-VN" altLang="vi-VN" sz="2400" b="0" i="0" u="none" strike="noStrike" cap="none" normalizeH="0" baseline="0" dirty="0" smtClean="0">
+                <a:ln>
+                  <a:noFill/>
+                </a:ln>
+                <a:solidFill>
+                  <a:srgbClr val="333333"/>
+                </a:solidFill>
+                <a:effectLst/>
+                <a:latin typeface="Arial" panose="020B0604020202020204" pitchFamily="34" charset="0"/>
+                <a:cs typeface="Arial" panose="020B0604020202020204" pitchFamily="34" charset="0"/>
+              </a:rPr>
+              <a:t> Tệp tin xuất bản, tệp này sẽ xuất hiện sau khi bạn biên</a:t>
+            </a:r>
           </a:p>
         </p:txBody>
       </p:sp>
@@ -6766,13 +6948,13 @@
         </p:nvSpPr>
         <p:spPr>
           <a:xfrm>
-            <a:off x="947790" y="1403798"/>
-            <a:ext cx="8596668" cy="4690712"/>
+            <a:off x="677334" y="1270000"/>
+            <a:ext cx="9097731" cy="4690712"/>
           </a:xfrm>
         </p:spPr>
         <p:txBody>
           <a:bodyPr>
-            <a:normAutofit/>
+            <a:noAutofit/>
           </a:bodyPr>
           <a:lstStyle/>
           <a:p>
@@ -6780,14 +6962,14 @@
               <a:buNone/>
             </a:pPr>
             <a:r>
-              <a:rPr lang="vi-VN" sz="3200" b="1" i="1" dirty="0"/>
+              <a:rPr lang="vi-VN" sz="2400" b="1" i="1" dirty="0"/>
               <a:t/>
             </a:r>
             <a:br>
-              <a:rPr lang="vi-VN" sz="3200" b="1" i="1" dirty="0"/>
+              <a:rPr lang="vi-VN" sz="2400" b="1" i="1" dirty="0"/>
             </a:br>
             <a:r>
-              <a:rPr lang="vi-VN" sz="3200" b="1" dirty="0">
+              <a:rPr lang="vi-VN" sz="2400" b="1" dirty="0">
                 <a:solidFill>
                   <a:schemeClr val="accent1"/>
                 </a:solidFill>
@@ -6795,7 +6977,7 @@
               <a:t>\ </a:t>
             </a:r>
             <a:r>
-              <a:rPr lang="vi-VN" sz="3200" b="1" dirty="0" smtClean="0">
+              <a:rPr lang="vi-VN" sz="2400" b="1" dirty="0" smtClean="0">
                 <a:solidFill>
                   <a:schemeClr val="accent1"/>
                 </a:solidFill>
@@ -6803,7 +6985,7 @@
               <a:t>Documentclass[options</a:t>
             </a:r>
             <a:r>
-              <a:rPr lang="vi-VN" sz="3200" b="1" dirty="0">
+              <a:rPr lang="vi-VN" sz="2400" b="1" dirty="0">
                 <a:solidFill>
                   <a:schemeClr val="accent1"/>
                 </a:solidFill>
@@ -6811,7 +6993,7 @@
               <a:t>] {</a:t>
             </a:r>
             <a:r>
-              <a:rPr lang="vi-VN" sz="3200" b="1" dirty="0" smtClean="0">
+              <a:rPr lang="vi-VN" sz="2400" b="1" dirty="0" smtClean="0">
                 <a:solidFill>
                   <a:schemeClr val="accent1"/>
                 </a:solidFill>
@@ -6821,37 +7003,57 @@
           </a:p>
           <a:p>
             <a:r>
-              <a:rPr lang="vi-VN" sz="3200" dirty="0" smtClean="0"/>
-              <a:t>Các lệnh LaTeX được khai báo sau dấu \ (splash)</a:t>
-            </a:r>
-          </a:p>
-          <a:p>
-            <a:r>
-              <a:rPr lang="vi-VN" sz="3200" dirty="0" smtClean="0"/>
-              <a:t>Options trong lệnh Documentclass là kích thước font chữ mặc định của toàn bộ văn bản trong latex , mặc định font size là 10 pt</a:t>
-            </a:r>
-          </a:p>
-          <a:p>
-            <a:r>
-              <a:rPr lang="vi-VN" sz="3200" i="1" dirty="0" smtClean="0"/>
-              <a:t>VD : \Documentclass[15pt</a:t>
-            </a:r>
-            <a:r>
-              <a:rPr lang="vi-VN" sz="3200" i="1" dirty="0"/>
-              <a:t>]{article}</a:t>
-            </a:r>
-          </a:p>
-          <a:p>
-            <a:endParaRPr lang="vi-VN" sz="3200" dirty="0" smtClean="0"/>
+              <a:rPr lang="vi-VN" sz="2400" dirty="0" smtClean="0"/>
+              <a:t>Các lệnh LaTeX được khai báo sau dấu \ (splash</a:t>
+            </a:r>
+            <a:r>
+              <a:rPr lang="vi-VN" sz="2400" dirty="0" smtClean="0"/>
+              <a:t>)</a:t>
+            </a:r>
+          </a:p>
+          <a:p>
+            <a:r>
+              <a:rPr lang="vi-VN" sz="2400" b="1" dirty="0"/>
+              <a:t>article</a:t>
+            </a:r>
+            <a:r>
+              <a:rPr lang="vi-VN" sz="2400" dirty="0"/>
+              <a:t> phù hợp khi soạn các bài báo trong các tạp chí khoa học, các văn bản trình diễn, các báo cáo ngắn, chương trình hoạt động, thư mời, . . .</a:t>
+            </a:r>
+          </a:p>
+          <a:p>
+            <a:r>
+              <a:rPr lang="vi-VN" sz="2400" b="1" dirty="0"/>
+              <a:t>report</a:t>
+            </a:r>
+            <a:r>
+              <a:rPr lang="vi-VN" sz="2400" dirty="0"/>
+              <a:t> phù hợp khi soạn các báo cáo gồm nhiều chương, các quyển sáchnhỏ, luận văn,. . .</a:t>
+            </a:r>
+          </a:p>
+          <a:p>
+            <a:r>
+              <a:rPr lang="vi-VN" sz="2400" b="1" dirty="0"/>
+              <a:t>book</a:t>
+            </a:r>
+            <a:r>
+              <a:rPr lang="vi-VN" sz="2400" dirty="0"/>
+              <a:t> phù hợp khi soạn </a:t>
+            </a:r>
+            <a:r>
+              <a:rPr lang="vi-VN" sz="2400" dirty="0" smtClean="0"/>
+              <a:t>sách</a:t>
+            </a:r>
+            <a:endParaRPr lang="vi-VN" sz="2400" dirty="0" smtClean="0"/>
           </a:p>
           <a:p>
             <a:pPr marL="0" indent="0">
               <a:buNone/>
             </a:pPr>
-            <a:endParaRPr lang="vi-VN" sz="3200" dirty="0" smtClean="0"/>
-          </a:p>
-          <a:p>
-            <a:endParaRPr lang="vi-VN" sz="3200" dirty="0"/>
+            <a:endParaRPr lang="vi-VN" sz="2400" dirty="0" smtClean="0"/>
+          </a:p>
+          <a:p>
+            <a:endParaRPr lang="vi-VN" sz="2400" dirty="0"/>
           </a:p>
         </p:txBody>
       </p:sp>
@@ -6908,8 +7110,8 @@
           <a:lstStyle/>
           <a:p>
             <a:r>
-              <a:rPr lang="vi-VN" dirty="0"/>
-              <a:t>Khai báo các gói lệnh sử dụng</a:t>
+              <a:rPr lang="en-US" dirty="0" smtClean="0"/>
+              <a:t>PHẦN MỞ ĐẦU CỦA MỘT FILE LATEX</a:t>
             </a:r>
             <a:endParaRPr lang="vi-VN" dirty="0"/>
           </a:p>
@@ -6927,13 +7129,13 @@
         </p:nvSpPr>
         <p:spPr>
           <a:xfrm>
-            <a:off x="-237066" y="2637107"/>
-            <a:ext cx="10797742" cy="3880773"/>
+            <a:off x="677334" y="1270000"/>
+            <a:ext cx="9097731" cy="4690712"/>
           </a:xfrm>
         </p:spPr>
         <p:txBody>
           <a:bodyPr>
-            <a:normAutofit/>
+            <a:noAutofit/>
           </a:bodyPr>
           <a:lstStyle/>
           <a:p>
@@ -6941,35 +7143,85 @@
               <a:buNone/>
             </a:pPr>
             <a:r>
-              <a:rPr lang="vi-VN" sz="4400" dirty="0" smtClean="0"/>
-              <a:t>Cú pháp: </a:t>
-            </a:r>
-          </a:p>
-          <a:p>
-            <a:pPr marL="0" indent="0" algn="ctr">
+              <a:rPr lang="vi-VN" sz="2400" b="1" i="1" dirty="0"/>
+              <a:t/>
+            </a:r>
+            <a:br>
+              <a:rPr lang="vi-VN" sz="2400" b="1" i="1" dirty="0"/>
+            </a:br>
+            <a:r>
+              <a:rPr lang="vi-VN" sz="2400" b="1" dirty="0">
+                <a:solidFill>
+                  <a:schemeClr val="accent1"/>
+                </a:solidFill>
+              </a:rPr>
+              <a:t>\ </a:t>
+            </a:r>
+            <a:r>
+              <a:rPr lang="vi-VN" sz="2400" b="1" dirty="0" smtClean="0">
+                <a:solidFill>
+                  <a:schemeClr val="accent1"/>
+                </a:solidFill>
+              </a:rPr>
+              <a:t>Documentclass[options</a:t>
+            </a:r>
+            <a:r>
+              <a:rPr lang="vi-VN" sz="2400" b="1" dirty="0">
+                <a:solidFill>
+                  <a:schemeClr val="accent1"/>
+                </a:solidFill>
+              </a:rPr>
+              <a:t>] {</a:t>
+            </a:r>
+            <a:r>
+              <a:rPr lang="vi-VN" sz="2400" b="1" dirty="0" smtClean="0">
+                <a:solidFill>
+                  <a:schemeClr val="accent1"/>
+                </a:solidFill>
+              </a:rPr>
+              <a:t>article}</a:t>
+            </a:r>
+          </a:p>
+          <a:p>
+            <a:r>
+              <a:rPr lang="vi-VN" sz="2400" dirty="0"/>
+              <a:t>Options trong lệnh Documentclass là kích thước font chữ mặc định của toàn bộ văn bản trong latex , mặc định font size là 10 pt</a:t>
+            </a:r>
+          </a:p>
+          <a:p>
+            <a:r>
+              <a:rPr lang="vi-VN" sz="2400" i="1" dirty="0"/>
+              <a:t>VD : \Documentclass[15pt]{article}</a:t>
+            </a:r>
+          </a:p>
+          <a:p>
+            <a:pPr marL="0" indent="0">
               <a:buNone/>
             </a:pPr>
-            <a:r>
-              <a:rPr lang="vi-VN" sz="4400" b="1" dirty="0" smtClean="0">
-                <a:solidFill>
-                  <a:schemeClr val="accent1"/>
-                </a:solidFill>
-              </a:rPr>
-              <a:t>\unpackage[options]{tên gói lệnh}</a:t>
-            </a:r>
+            <a:endParaRPr lang="vi-VN" sz="2400" dirty="0" smtClean="0"/>
+          </a:p>
+          <a:p>
+            <a:endParaRPr lang="vi-VN" sz="2400" dirty="0"/>
           </a:p>
         </p:txBody>
       </p:sp>
     </p:spTree>
     <p:extLst>
       <p:ext uri="{BB962C8B-B14F-4D97-AF65-F5344CB8AC3E}">
-        <p14:creationId xmlns:p14="http://schemas.microsoft.com/office/powerpoint/2010/main" val="940974117"/>
+        <p14:creationId xmlns:p14="http://schemas.microsoft.com/office/powerpoint/2010/main" val="172330463"/>
       </p:ext>
     </p:extLst>
   </p:cSld>
   <p:clrMapOvr>
     <a:masterClrMapping/>
   </p:clrMapOvr>
+  <p:timing>
+    <p:tnLst>
+      <p:par>
+        <p:cTn id="1" dur="indefinite" restart="never" nodeType="tmRoot"/>
+      </p:par>
+    </p:tnLst>
+  </p:timing>
 </p:sld>
 </file>
 
@@ -7006,10 +7258,9 @@
           <a:lstStyle/>
           <a:p>
             <a:r>
-              <a:rPr lang="vi-VN" dirty="0" smtClean="0"/>
-              <a:t>Các gói lệnh hay sử dụng </a:t>
-            </a:r>
-            <a:endParaRPr lang="vi-VN" dirty="0"/>
+              <a:rPr lang="vi-VN" dirty="0"/>
+              <a:t>Khai báo các gói lệnh sử dụng</a:t>
+            </a:r>
           </a:p>
         </p:txBody>
       </p:sp>
@@ -7025,288 +7276,43 @@
         </p:nvSpPr>
         <p:spPr>
           <a:xfrm>
-            <a:off x="677334" y="2084947"/>
-            <a:ext cx="9418489" cy="3880773"/>
+            <a:off x="-237066" y="2637107"/>
+            <a:ext cx="10797742" cy="3880773"/>
           </a:xfrm>
         </p:spPr>
         <p:txBody>
           <a:bodyPr>
-            <a:noAutofit/>
+            <a:normAutofit/>
           </a:bodyPr>
           <a:lstStyle/>
           <a:p>
-            <a:r>
-              <a:rPr lang="en-US" sz="3200" dirty="0" err="1" smtClean="0"/>
-              <a:t>Gói</a:t>
-            </a:r>
-            <a:r>
-              <a:rPr lang="en-US" sz="3200" dirty="0" smtClean="0"/>
-              <a:t> </a:t>
-            </a:r>
-            <a:r>
-              <a:rPr lang="en-US" sz="3200" dirty="0" err="1" smtClean="0"/>
-              <a:t>ngôn</a:t>
-            </a:r>
-            <a:r>
-              <a:rPr lang="en-US" sz="3200" dirty="0" smtClean="0"/>
-              <a:t> </a:t>
-            </a:r>
-            <a:r>
-              <a:rPr lang="en-US" sz="3200" dirty="0" err="1" smtClean="0"/>
-              <a:t>ngữ</a:t>
-            </a:r>
-            <a:r>
-              <a:rPr lang="en-US" sz="3200" dirty="0" smtClean="0"/>
-              <a:t> </a:t>
-            </a:r>
-            <a:r>
-              <a:rPr lang="en-US" sz="3200" dirty="0" err="1" smtClean="0"/>
-              <a:t>tiếng</a:t>
-            </a:r>
-            <a:r>
-              <a:rPr lang="en-US" sz="3200" dirty="0" smtClean="0"/>
-              <a:t> </a:t>
-            </a:r>
-            <a:r>
-              <a:rPr lang="en-US" sz="3200" dirty="0" err="1" smtClean="0"/>
-              <a:t>việt</a:t>
-            </a:r>
-            <a:r>
-              <a:rPr lang="en-US" sz="3200" dirty="0"/>
-              <a:t>: \</a:t>
-            </a:r>
-            <a:r>
-              <a:rPr lang="en-US" sz="3200" dirty="0" err="1"/>
-              <a:t>usepackage</a:t>
-            </a:r>
-            <a:r>
-              <a:rPr lang="en-US" sz="3200" dirty="0"/>
-              <a:t>[utf8]{</a:t>
-            </a:r>
-            <a:r>
-              <a:rPr lang="en-US" sz="3200" dirty="0" err="1"/>
-              <a:t>vietnam</a:t>
-            </a:r>
-            <a:r>
-              <a:rPr lang="en-US" sz="3200" dirty="0" smtClean="0"/>
-              <a:t>}</a:t>
-            </a:r>
-          </a:p>
-          <a:p>
-            <a:r>
-              <a:rPr lang="en-US" sz="3200" dirty="0" err="1" smtClean="0"/>
-              <a:t>Gói</a:t>
-            </a:r>
-            <a:r>
-              <a:rPr lang="en-US" sz="3200" dirty="0" smtClean="0"/>
-              <a:t> </a:t>
-            </a:r>
-            <a:r>
-              <a:rPr lang="en-US" sz="3200" dirty="0" err="1" smtClean="0"/>
-              <a:t>gạch</a:t>
-            </a:r>
-            <a:r>
-              <a:rPr lang="en-US" sz="3200" dirty="0" smtClean="0"/>
-              <a:t> </a:t>
-            </a:r>
-            <a:r>
-              <a:rPr lang="en-US" sz="3200" dirty="0" err="1" smtClean="0"/>
-              <a:t>chân</a:t>
-            </a:r>
-            <a:r>
-              <a:rPr lang="en-US" sz="3200" dirty="0" smtClean="0"/>
-              <a:t> </a:t>
-            </a:r>
-            <a:r>
-              <a:rPr lang="en-US" sz="3200" dirty="0" err="1" smtClean="0"/>
-              <a:t>văn</a:t>
-            </a:r>
-            <a:r>
-              <a:rPr lang="en-US" sz="3200" dirty="0" smtClean="0"/>
-              <a:t> </a:t>
-            </a:r>
-            <a:r>
-              <a:rPr lang="en-US" sz="3200" dirty="0" err="1" smtClean="0"/>
-              <a:t>bản</a:t>
-            </a:r>
-            <a:r>
-              <a:rPr lang="en-US" sz="3200" dirty="0"/>
-              <a:t> : \</a:t>
-            </a:r>
-            <a:r>
-              <a:rPr lang="en-US" sz="3200" dirty="0" err="1"/>
-              <a:t>usepackage</a:t>
-            </a:r>
-            <a:r>
-              <a:rPr lang="en-US" sz="3200" dirty="0"/>
-              <a:t>{</a:t>
-            </a:r>
-            <a:r>
-              <a:rPr lang="en-US" sz="3200" dirty="0" err="1"/>
-              <a:t>ulem</a:t>
-            </a:r>
-            <a:r>
-              <a:rPr lang="en-US" sz="3200" dirty="0" smtClean="0"/>
-              <a:t>}</a:t>
-            </a:r>
-          </a:p>
-          <a:p>
-            <a:r>
-              <a:rPr lang="en-US" sz="3200" dirty="0" err="1" smtClean="0"/>
-              <a:t>Gói</a:t>
-            </a:r>
-            <a:r>
-              <a:rPr lang="en-US" sz="3200" dirty="0" smtClean="0"/>
-              <a:t> </a:t>
-            </a:r>
-            <a:r>
-              <a:rPr lang="en-US" sz="3200" dirty="0" err="1" smtClean="0"/>
-              <a:t>viết</a:t>
-            </a:r>
-            <a:r>
-              <a:rPr lang="en-US" sz="3200" dirty="0" smtClean="0"/>
-              <a:t> </a:t>
-            </a:r>
-            <a:r>
-              <a:rPr lang="en-US" sz="3200" dirty="0" err="1" smtClean="0"/>
-              <a:t>ký</a:t>
-            </a:r>
-            <a:r>
-              <a:rPr lang="en-US" sz="3200" dirty="0" smtClean="0"/>
-              <a:t> </a:t>
-            </a:r>
-            <a:r>
-              <a:rPr lang="en-US" sz="3200" dirty="0" err="1" smtClean="0"/>
-              <a:t>hiệu</a:t>
-            </a:r>
-            <a:r>
-              <a:rPr lang="en-US" sz="3200" dirty="0" smtClean="0"/>
-              <a:t> </a:t>
-            </a:r>
-            <a:r>
-              <a:rPr lang="en-US" sz="3200" dirty="0" err="1" smtClean="0"/>
-              <a:t>toán</a:t>
-            </a:r>
-            <a:r>
-              <a:rPr lang="en-US" sz="3200" dirty="0" smtClean="0"/>
-              <a:t> </a:t>
-            </a:r>
-            <a:r>
-              <a:rPr lang="en-US" sz="3200" dirty="0" err="1" smtClean="0"/>
-              <a:t>học</a:t>
-            </a:r>
-            <a:r>
-              <a:rPr lang="en-US" sz="3200" dirty="0" smtClean="0"/>
-              <a:t>:\</a:t>
-            </a:r>
-            <a:r>
-              <a:rPr lang="en-US" sz="3200" dirty="0" err="1" smtClean="0"/>
-              <a:t>usepackage</a:t>
-            </a:r>
-            <a:r>
-              <a:rPr lang="en-US" sz="3200" dirty="0" smtClean="0"/>
-              <a:t>{</a:t>
-            </a:r>
-            <a:r>
-              <a:rPr lang="en-US" sz="3200" dirty="0" err="1" smtClean="0"/>
-              <a:t>amsmath</a:t>
-            </a:r>
-            <a:r>
-              <a:rPr lang="en-US" sz="3200" dirty="0" smtClean="0"/>
-              <a:t>}</a:t>
-            </a:r>
-          </a:p>
-          <a:p>
-            <a:r>
-              <a:rPr lang="en-US" sz="3200" dirty="0" err="1" smtClean="0"/>
-              <a:t>Gói</a:t>
-            </a:r>
-            <a:r>
-              <a:rPr lang="en-US" sz="3200" dirty="0" smtClean="0"/>
-              <a:t> </a:t>
-            </a:r>
-            <a:r>
-              <a:rPr lang="en-US" sz="3200" dirty="0" err="1" smtClean="0"/>
-              <a:t>thêm</a:t>
-            </a:r>
-            <a:r>
-              <a:rPr lang="en-US" sz="3200" dirty="0" smtClean="0"/>
-              <a:t> </a:t>
-            </a:r>
-            <a:r>
-              <a:rPr lang="en-US" sz="3200" dirty="0" err="1" smtClean="0"/>
-              <a:t>hình</a:t>
-            </a:r>
-            <a:r>
-              <a:rPr lang="en-US" sz="3200" dirty="0" smtClean="0"/>
-              <a:t> </a:t>
-            </a:r>
-            <a:r>
-              <a:rPr lang="en-US" sz="3200" dirty="0" err="1" smtClean="0"/>
-              <a:t>ảnh</a:t>
-            </a:r>
-            <a:r>
-              <a:rPr lang="en-US" sz="3200" dirty="0" smtClean="0"/>
-              <a:t> </a:t>
-            </a:r>
-            <a:r>
-              <a:rPr lang="en-US" sz="3200" dirty="0" err="1" smtClean="0"/>
-              <a:t>từ</a:t>
-            </a:r>
-            <a:r>
-              <a:rPr lang="en-US" sz="3200" dirty="0" smtClean="0"/>
-              <a:t> </a:t>
-            </a:r>
-            <a:r>
-              <a:rPr lang="en-US" sz="3200" dirty="0" err="1" smtClean="0"/>
-              <a:t>bên</a:t>
-            </a:r>
-            <a:r>
-              <a:rPr lang="en-US" sz="3200" dirty="0" smtClean="0"/>
-              <a:t> </a:t>
-            </a:r>
-            <a:r>
-              <a:rPr lang="en-US" sz="3200" dirty="0" err="1" smtClean="0"/>
-              <a:t>ngoài</a:t>
-            </a:r>
-            <a:r>
-              <a:rPr lang="en-US" sz="3200" dirty="0"/>
-              <a:t> \</a:t>
-            </a:r>
-            <a:r>
-              <a:rPr lang="en-US" sz="3200" dirty="0" err="1"/>
-              <a:t>usepackage</a:t>
-            </a:r>
-            <a:r>
-              <a:rPr lang="en-US" sz="3200" dirty="0"/>
-              <a:t>{</a:t>
-            </a:r>
-            <a:r>
-              <a:rPr lang="en-US" sz="3200" dirty="0" err="1"/>
-              <a:t>graphicx</a:t>
-            </a:r>
-            <a:r>
-              <a:rPr lang="en-US" sz="3200" dirty="0"/>
-              <a:t>} </a:t>
-            </a:r>
-            <a:endParaRPr lang="en-US" sz="3200" dirty="0" smtClean="0"/>
-          </a:p>
-          <a:p>
             <a:pPr marL="0" indent="0" algn="ctr">
               <a:buNone/>
             </a:pPr>
             <a:r>
-              <a:rPr lang="en-US" sz="3200" dirty="0" smtClean="0"/>
-              <a:t>…</a:t>
-            </a:r>
-            <a:endParaRPr lang="vi-VN" sz="3200" dirty="0"/>
+              <a:rPr lang="vi-VN" sz="4400" dirty="0" smtClean="0"/>
+              <a:t>Cú pháp: </a:t>
+            </a:r>
+          </a:p>
+          <a:p>
+            <a:pPr marL="0" indent="0" algn="ctr">
+              <a:buNone/>
+            </a:pPr>
+            <a:r>
+              <a:rPr lang="vi-VN" sz="4400" b="1" dirty="0" smtClean="0">
+                <a:solidFill>
+                  <a:schemeClr val="accent1"/>
+                </a:solidFill>
+              </a:rPr>
+              <a:t>\unpackage[options]{tên gói lệnh}</a:t>
+            </a:r>
           </a:p>
         </p:txBody>
       </p:sp>
     </p:spTree>
     <p:extLst>
       <p:ext uri="{BB962C8B-B14F-4D97-AF65-F5344CB8AC3E}">
-        <p14:creationId xmlns:p14="http://schemas.microsoft.com/office/powerpoint/2010/main" val="3101947269"/>
+        <p14:creationId xmlns:p14="http://schemas.microsoft.com/office/powerpoint/2010/main" val="940974117"/>
       </p:ext>
     </p:extLst>
   </p:cSld>
@@ -7350,7 +7356,7 @@
           <a:p>
             <a:r>
               <a:rPr lang="vi-VN" dirty="0" smtClean="0"/>
-              <a:t>KHAI BÁO TIÊU ĐỀ , TÁC GIẢ , NGÀY THÁNG </a:t>
+              <a:t>Các gói lệnh hay sử dụng </a:t>
             </a:r>
             <a:endParaRPr lang="vi-VN" dirty="0"/>
           </a:p>
@@ -7368,49 +7374,288 @@
         </p:nvSpPr>
         <p:spPr>
           <a:xfrm>
-            <a:off x="896275" y="2495439"/>
-            <a:ext cx="8596668" cy="3880773"/>
+            <a:off x="677334" y="2084947"/>
+            <a:ext cx="9418489" cy="3880773"/>
           </a:xfrm>
         </p:spPr>
         <p:txBody>
           <a:bodyPr>
-            <a:normAutofit/>
+            <a:noAutofit/>
           </a:bodyPr>
           <a:lstStyle/>
           <a:p>
-            <a:pPr marL="0" indent="0">
+            <a:r>
+              <a:rPr lang="en-US" sz="3200" dirty="0" err="1" smtClean="0"/>
+              <a:t>Gói</a:t>
+            </a:r>
+            <a:r>
+              <a:rPr lang="en-US" sz="3200" dirty="0" smtClean="0"/>
+              <a:t> </a:t>
+            </a:r>
+            <a:r>
+              <a:rPr lang="en-US" sz="3200" dirty="0" err="1" smtClean="0"/>
+              <a:t>ngôn</a:t>
+            </a:r>
+            <a:r>
+              <a:rPr lang="en-US" sz="3200" dirty="0" smtClean="0"/>
+              <a:t> </a:t>
+            </a:r>
+            <a:r>
+              <a:rPr lang="en-US" sz="3200" dirty="0" err="1" smtClean="0"/>
+              <a:t>ngữ</a:t>
+            </a:r>
+            <a:r>
+              <a:rPr lang="en-US" sz="3200" dirty="0" smtClean="0"/>
+              <a:t> </a:t>
+            </a:r>
+            <a:r>
+              <a:rPr lang="en-US" sz="3200" dirty="0" err="1" smtClean="0"/>
+              <a:t>tiếng</a:t>
+            </a:r>
+            <a:r>
+              <a:rPr lang="en-US" sz="3200" dirty="0" smtClean="0"/>
+              <a:t> </a:t>
+            </a:r>
+            <a:r>
+              <a:rPr lang="en-US" sz="3200" dirty="0" err="1" smtClean="0"/>
+              <a:t>việt</a:t>
+            </a:r>
+            <a:r>
+              <a:rPr lang="en-US" sz="3200" dirty="0"/>
+              <a:t>: \</a:t>
+            </a:r>
+            <a:r>
+              <a:rPr lang="en-US" sz="3200" dirty="0" err="1"/>
+              <a:t>usepackage</a:t>
+            </a:r>
+            <a:r>
+              <a:rPr lang="en-US" sz="3200" dirty="0"/>
+              <a:t>[utf8]{</a:t>
+            </a:r>
+            <a:r>
+              <a:rPr lang="en-US" sz="3200" dirty="0" err="1"/>
+              <a:t>vietnam</a:t>
+            </a:r>
+            <a:r>
+              <a:rPr lang="en-US" sz="3200" dirty="0" smtClean="0"/>
+              <a:t>}</a:t>
+            </a:r>
+          </a:p>
+          <a:p>
+            <a:r>
+              <a:rPr lang="en-US" sz="3200" dirty="0" err="1" smtClean="0"/>
+              <a:t>Gói</a:t>
+            </a:r>
+            <a:r>
+              <a:rPr lang="en-US" sz="3200" dirty="0" smtClean="0"/>
+              <a:t> </a:t>
+            </a:r>
+            <a:r>
+              <a:rPr lang="en-US" sz="3200" dirty="0" err="1" smtClean="0"/>
+              <a:t>gạch</a:t>
+            </a:r>
+            <a:r>
+              <a:rPr lang="en-US" sz="3200" dirty="0" smtClean="0"/>
+              <a:t> </a:t>
+            </a:r>
+            <a:r>
+              <a:rPr lang="en-US" sz="3200" dirty="0" err="1" smtClean="0"/>
+              <a:t>chân</a:t>
+            </a:r>
+            <a:r>
+              <a:rPr lang="en-US" sz="3200" dirty="0" smtClean="0"/>
+              <a:t> </a:t>
+            </a:r>
+            <a:r>
+              <a:rPr lang="en-US" sz="3200" dirty="0" err="1" smtClean="0"/>
+              <a:t>văn</a:t>
+            </a:r>
+            <a:r>
+              <a:rPr lang="en-US" sz="3200" dirty="0" smtClean="0"/>
+              <a:t> </a:t>
+            </a:r>
+            <a:r>
+              <a:rPr lang="en-US" sz="3200" dirty="0" err="1" smtClean="0"/>
+              <a:t>bản</a:t>
+            </a:r>
+            <a:r>
+              <a:rPr lang="en-US" sz="3200" dirty="0"/>
+              <a:t> : \</a:t>
+            </a:r>
+            <a:r>
+              <a:rPr lang="en-US" sz="3200" dirty="0" err="1"/>
+              <a:t>usepackage</a:t>
+            </a:r>
+            <a:r>
+              <a:rPr lang="en-US" sz="3200" dirty="0"/>
+              <a:t>{</a:t>
+            </a:r>
+            <a:r>
+              <a:rPr lang="en-US" sz="3200" dirty="0" err="1"/>
+              <a:t>ulem</a:t>
+            </a:r>
+            <a:r>
+              <a:rPr lang="en-US" sz="3200" dirty="0" smtClean="0"/>
+              <a:t>}</a:t>
+            </a:r>
+          </a:p>
+          <a:p>
+            <a:r>
+              <a:rPr lang="en-US" sz="3200" dirty="0" err="1" smtClean="0"/>
+              <a:t>Gói</a:t>
+            </a:r>
+            <a:r>
+              <a:rPr lang="en-US" sz="3200" dirty="0" smtClean="0"/>
+              <a:t> </a:t>
+            </a:r>
+            <a:r>
+              <a:rPr lang="en-US" sz="3200" dirty="0" err="1" smtClean="0"/>
+              <a:t>viết</a:t>
+            </a:r>
+            <a:r>
+              <a:rPr lang="en-US" sz="3200" dirty="0" smtClean="0"/>
+              <a:t> </a:t>
+            </a:r>
+            <a:r>
+              <a:rPr lang="en-US" sz="3200" dirty="0" err="1" smtClean="0"/>
+              <a:t>ký</a:t>
+            </a:r>
+            <a:r>
+              <a:rPr lang="en-US" sz="3200" dirty="0" smtClean="0"/>
+              <a:t> </a:t>
+            </a:r>
+            <a:r>
+              <a:rPr lang="en-US" sz="3200" dirty="0" err="1" smtClean="0"/>
+              <a:t>hiệu</a:t>
+            </a:r>
+            <a:r>
+              <a:rPr lang="en-US" sz="3200" dirty="0" smtClean="0"/>
+              <a:t> </a:t>
+            </a:r>
+            <a:r>
+              <a:rPr lang="en-US" sz="3200" dirty="0" err="1" smtClean="0"/>
+              <a:t>toán</a:t>
+            </a:r>
+            <a:r>
+              <a:rPr lang="en-US" sz="3200" dirty="0" smtClean="0"/>
+              <a:t> </a:t>
+            </a:r>
+            <a:r>
+              <a:rPr lang="en-US" sz="3200" dirty="0" err="1" smtClean="0"/>
+              <a:t>học</a:t>
+            </a:r>
+            <a:r>
+              <a:rPr lang="en-US" sz="3200" dirty="0" smtClean="0"/>
+              <a:t>:\</a:t>
+            </a:r>
+            <a:r>
+              <a:rPr lang="en-US" sz="3200" dirty="0" err="1" smtClean="0"/>
+              <a:t>usepackage</a:t>
+            </a:r>
+            <a:r>
+              <a:rPr lang="en-US" sz="3200" dirty="0" smtClean="0"/>
+              <a:t>{</a:t>
+            </a:r>
+            <a:r>
+              <a:rPr lang="en-US" sz="3200" dirty="0" err="1" smtClean="0"/>
+              <a:t>amsmath</a:t>
+            </a:r>
+            <a:r>
+              <a:rPr lang="en-US" sz="3200" dirty="0" smtClean="0"/>
+              <a:t>}</a:t>
+            </a:r>
+          </a:p>
+          <a:p>
+            <a:r>
+              <a:rPr lang="en-US" sz="3200" dirty="0" err="1" smtClean="0"/>
+              <a:t>Gói</a:t>
+            </a:r>
+            <a:r>
+              <a:rPr lang="en-US" sz="3200" dirty="0" smtClean="0"/>
+              <a:t> </a:t>
+            </a:r>
+            <a:r>
+              <a:rPr lang="en-US" sz="3200" dirty="0" err="1" smtClean="0"/>
+              <a:t>thêm</a:t>
+            </a:r>
+            <a:r>
+              <a:rPr lang="en-US" sz="3200" dirty="0" smtClean="0"/>
+              <a:t> </a:t>
+            </a:r>
+            <a:r>
+              <a:rPr lang="en-US" sz="3200" dirty="0" err="1" smtClean="0"/>
+              <a:t>hình</a:t>
+            </a:r>
+            <a:r>
+              <a:rPr lang="en-US" sz="3200" dirty="0" smtClean="0"/>
+              <a:t> </a:t>
+            </a:r>
+            <a:r>
+              <a:rPr lang="en-US" sz="3200" dirty="0" err="1" smtClean="0"/>
+              <a:t>ảnh</a:t>
+            </a:r>
+            <a:r>
+              <a:rPr lang="en-US" sz="3200" dirty="0" smtClean="0"/>
+              <a:t> </a:t>
+            </a:r>
+            <a:r>
+              <a:rPr lang="en-US" sz="3200" dirty="0" err="1" smtClean="0"/>
+              <a:t>từ</a:t>
+            </a:r>
+            <a:r>
+              <a:rPr lang="en-US" sz="3200" dirty="0" smtClean="0"/>
+              <a:t> </a:t>
+            </a:r>
+            <a:r>
+              <a:rPr lang="en-US" sz="3200" dirty="0" err="1" smtClean="0"/>
+              <a:t>bên</a:t>
+            </a:r>
+            <a:r>
+              <a:rPr lang="en-US" sz="3200" dirty="0" smtClean="0"/>
+              <a:t> </a:t>
+            </a:r>
+            <a:r>
+              <a:rPr lang="en-US" sz="3200" dirty="0" err="1" smtClean="0"/>
+              <a:t>ngoài</a:t>
+            </a:r>
+            <a:r>
+              <a:rPr lang="en-US" sz="3200" dirty="0"/>
+              <a:t> \</a:t>
+            </a:r>
+            <a:r>
+              <a:rPr lang="en-US" sz="3200" dirty="0" err="1"/>
+              <a:t>usepackage</a:t>
+            </a:r>
+            <a:r>
+              <a:rPr lang="en-US" sz="3200" dirty="0"/>
+              <a:t>{</a:t>
+            </a:r>
+            <a:r>
+              <a:rPr lang="en-US" sz="3200" dirty="0" err="1"/>
+              <a:t>graphicx</a:t>
+            </a:r>
+            <a:r>
+              <a:rPr lang="en-US" sz="3200" dirty="0"/>
+              <a:t>} </a:t>
+            </a:r>
+            <a:endParaRPr lang="en-US" sz="3200" dirty="0" smtClean="0"/>
+          </a:p>
+          <a:p>
+            <a:pPr marL="0" indent="0" algn="ctr">
               <a:buNone/>
             </a:pPr>
             <a:r>
-              <a:rPr lang="vi-VN" sz="3600" dirty="0" smtClean="0"/>
-              <a:t>\title{Nội dung tiêu đề}</a:t>
-            </a:r>
-          </a:p>
-          <a:p>
-            <a:pPr marL="0" indent="0">
-              <a:buNone/>
-            </a:pPr>
-            <a:r>
-              <a:rPr lang="vi-VN" sz="3600" dirty="0" smtClean="0"/>
-              <a:t>\author{Tên tác giả \ thanks{Nội dung} }</a:t>
-            </a:r>
-          </a:p>
-          <a:p>
-            <a:pPr marL="0" indent="0">
-              <a:buNone/>
-            </a:pPr>
-            <a:r>
-              <a:rPr lang="vi-VN" sz="3600" dirty="0" smtClean="0"/>
-              <a:t>\date{Nội dung}</a:t>
-            </a:r>
-            <a:endParaRPr lang="vi-VN" sz="3600" dirty="0"/>
+              <a:rPr lang="en-US" sz="3200" dirty="0" smtClean="0"/>
+              <a:t>…</a:t>
+            </a:r>
+            <a:endParaRPr lang="vi-VN" sz="3200" dirty="0"/>
           </a:p>
         </p:txBody>
       </p:sp>
     </p:spTree>
     <p:extLst>
       <p:ext uri="{BB962C8B-B14F-4D97-AF65-F5344CB8AC3E}">
-        <p14:creationId xmlns:p14="http://schemas.microsoft.com/office/powerpoint/2010/main" val="196841316"/>
+        <p14:creationId xmlns:p14="http://schemas.microsoft.com/office/powerpoint/2010/main" val="3101947269"/>
       </p:ext>
     </p:extLst>
   </p:cSld>
@@ -7453,80 +7698,8 @@
           <a:lstStyle/>
           <a:p>
             <a:r>
-              <a:rPr lang="en-US" dirty="0" err="1" smtClean="0"/>
-              <a:t>Khai</a:t>
-            </a:r>
-            <a:r>
-              <a:rPr lang="en-US" dirty="0" smtClean="0"/>
-              <a:t> </a:t>
-            </a:r>
-            <a:r>
-              <a:rPr lang="en-US" dirty="0" err="1" smtClean="0"/>
-              <a:t>báo</a:t>
-            </a:r>
-            <a:r>
-              <a:rPr lang="en-US" dirty="0" smtClean="0"/>
-              <a:t> </a:t>
-            </a:r>
-            <a:r>
-              <a:rPr lang="en-US" dirty="0" err="1" smtClean="0"/>
-              <a:t>bắt</a:t>
-            </a:r>
-            <a:r>
-              <a:rPr lang="en-US" dirty="0" smtClean="0"/>
-              <a:t> </a:t>
-            </a:r>
-            <a:r>
-              <a:rPr lang="en-US" dirty="0" err="1" smtClean="0"/>
-              <a:t>đầu</a:t>
-            </a:r>
-            <a:r>
-              <a:rPr lang="en-US" dirty="0" smtClean="0"/>
-              <a:t> </a:t>
-            </a:r>
-            <a:r>
-              <a:rPr lang="en-US" dirty="0" err="1" smtClean="0"/>
-              <a:t>và</a:t>
-            </a:r>
-            <a:r>
-              <a:rPr lang="en-US" dirty="0" smtClean="0"/>
-              <a:t> </a:t>
-            </a:r>
-            <a:r>
-              <a:rPr lang="en-US" dirty="0" err="1" smtClean="0"/>
-              <a:t>kết</a:t>
-            </a:r>
-            <a:r>
-              <a:rPr lang="en-US" dirty="0" smtClean="0"/>
-              <a:t> </a:t>
-            </a:r>
-            <a:r>
-              <a:rPr lang="en-US" dirty="0" err="1" smtClean="0"/>
-              <a:t>thúc</a:t>
-            </a:r>
-            <a:r>
-              <a:rPr lang="en-US" dirty="0" smtClean="0"/>
-              <a:t> </a:t>
-            </a:r>
-            <a:r>
-              <a:rPr lang="en-US" dirty="0" err="1" smtClean="0"/>
-              <a:t>của</a:t>
-            </a:r>
-            <a:r>
-              <a:rPr lang="en-US" dirty="0" smtClean="0"/>
-              <a:t> </a:t>
-            </a:r>
-            <a:r>
-              <a:rPr lang="en-US" dirty="0" err="1" smtClean="0"/>
-              <a:t>văn</a:t>
-            </a:r>
-            <a:r>
-              <a:rPr lang="en-US" dirty="0" smtClean="0"/>
-              <a:t> </a:t>
-            </a:r>
-            <a:r>
-              <a:rPr lang="en-US" dirty="0" err="1" smtClean="0"/>
-              <a:t>bản</a:t>
+              <a:rPr lang="vi-VN" dirty="0" smtClean="0"/>
+              <a:t>KHAI BÁO TIÊU ĐỀ , TÁC GIẢ , NGÀY THÁNG </a:t>
             </a:r>
             <a:endParaRPr lang="vi-VN" dirty="0"/>
           </a:p>
@@ -7544,7 +7717,7 @@
         </p:nvSpPr>
         <p:spPr>
           <a:xfrm>
-            <a:off x="1514460" y="1748465"/>
+            <a:off x="896275" y="2495439"/>
             <a:ext cx="8596668" cy="3880773"/>
           </a:xfrm>
         </p:spPr>
@@ -7558,220 +7731,26 @@
               <a:buNone/>
             </a:pPr>
             <a:r>
-              <a:rPr lang="en-US" sz="4400" dirty="0" smtClean="0">
-                <a:solidFill>
-                  <a:schemeClr val="tx1"/>
-                </a:solidFill>
-              </a:rPr>
-              <a:t>\begin{document}</a:t>
+              <a:rPr lang="vi-VN" sz="3600" dirty="0" smtClean="0"/>
+              <a:t>\title{Nội dung tiêu đề}</a:t>
             </a:r>
           </a:p>
           <a:p>
             <a:pPr marL="0" indent="0">
               <a:buNone/>
             </a:pPr>
-            <a:endParaRPr lang="en-US" sz="4400" dirty="0" smtClean="0">
-              <a:solidFill>
-                <a:schemeClr val="tx1"/>
-              </a:solidFill>
-            </a:endParaRPr>
+            <a:r>
+              <a:rPr lang="vi-VN" sz="3600" dirty="0" smtClean="0"/>
+              <a:t>\author{Tên tác giả \ thanks{Nội dung} }</a:t>
+            </a:r>
           </a:p>
           <a:p>
             <a:pPr marL="0" indent="0">
               <a:buNone/>
             </a:pPr>
             <a:r>
-              <a:rPr lang="en-US" sz="4400" dirty="0" smtClean="0">
-                <a:solidFill>
-                  <a:schemeClr val="tx1"/>
-                </a:solidFill>
-              </a:rPr>
-              <a:t>\end{document}</a:t>
-            </a:r>
-            <a:endParaRPr lang="en-US" sz="4400" dirty="0">
-              <a:solidFill>
-                <a:schemeClr val="tx1"/>
-              </a:solidFill>
-            </a:endParaRPr>
-          </a:p>
-        </p:txBody>
-      </p:sp>
-      <p:sp>
-        <p:nvSpPr>
-          <p:cNvPr id="4" name="TextBox 3"/>
-          <p:cNvSpPr txBox="1"/>
-          <p:nvPr/>
-        </p:nvSpPr>
-        <p:spPr>
-          <a:xfrm>
-            <a:off x="677334" y="4616948"/>
-            <a:ext cx="7972022" cy="1754326"/>
-          </a:xfrm>
-          <a:prstGeom prst="rect">
-            <a:avLst/>
-          </a:prstGeom>
-          <a:noFill/>
-        </p:spPr>
-        <p:txBody>
-          <a:bodyPr wrap="square" rtlCol="0">
-            <a:spAutoFit/>
-          </a:bodyPr>
-          <a:lstStyle/>
-          <a:p>
-            <a:r>
-              <a:rPr lang="en-US" sz="3600" dirty="0" err="1" smtClean="0"/>
-              <a:t>Các</a:t>
-            </a:r>
-            <a:r>
-              <a:rPr lang="en-US" sz="3600" dirty="0" smtClean="0"/>
-              <a:t> </a:t>
-            </a:r>
-            <a:r>
-              <a:rPr lang="en-US" sz="3600" dirty="0" err="1" smtClean="0"/>
-              <a:t>lệnh</a:t>
-            </a:r>
-            <a:r>
-              <a:rPr lang="en-US" sz="3600" dirty="0" smtClean="0"/>
-              <a:t> </a:t>
-            </a:r>
-            <a:r>
-              <a:rPr lang="en-US" sz="3600" dirty="0" err="1" smtClean="0"/>
-              <a:t>và</a:t>
-            </a:r>
-            <a:r>
-              <a:rPr lang="en-US" sz="3600" dirty="0" smtClean="0"/>
-              <a:t> </a:t>
-            </a:r>
-            <a:r>
-              <a:rPr lang="en-US" sz="3600" dirty="0" err="1" smtClean="0"/>
-              <a:t>nội</a:t>
-            </a:r>
-            <a:r>
-              <a:rPr lang="en-US" sz="3600" dirty="0" smtClean="0"/>
-              <a:t> dung </a:t>
-            </a:r>
-            <a:r>
-              <a:rPr lang="en-US" sz="3600" dirty="0" err="1" smtClean="0"/>
-              <a:t>văn</a:t>
-            </a:r>
-            <a:r>
-              <a:rPr lang="en-US" sz="3600" dirty="0" smtClean="0"/>
-              <a:t> </a:t>
-            </a:r>
-            <a:r>
-              <a:rPr lang="en-US" sz="3600" dirty="0" err="1" smtClean="0"/>
-              <a:t>bản</a:t>
-            </a:r>
-            <a:r>
-              <a:rPr lang="en-US" sz="3600" dirty="0" smtClean="0"/>
-              <a:t> </a:t>
-            </a:r>
-            <a:r>
-              <a:rPr lang="en-US" sz="3600" dirty="0" err="1" smtClean="0"/>
-              <a:t>sẽ</a:t>
-            </a:r>
-            <a:r>
-              <a:rPr lang="en-US" sz="3600" dirty="0" smtClean="0"/>
-              <a:t> </a:t>
-            </a:r>
-            <a:r>
-              <a:rPr lang="en-US" sz="3600" dirty="0" err="1" smtClean="0"/>
-              <a:t>được</a:t>
-            </a:r>
-            <a:r>
-              <a:rPr lang="en-US" sz="3600" dirty="0" smtClean="0"/>
-              <a:t> </a:t>
-            </a:r>
-            <a:r>
-              <a:rPr lang="en-US" sz="3600" dirty="0" err="1" smtClean="0"/>
-              <a:t>tập</a:t>
-            </a:r>
-            <a:r>
-              <a:rPr lang="en-US" sz="3600" dirty="0" smtClean="0"/>
-              <a:t> </a:t>
-            </a:r>
-            <a:r>
-              <a:rPr lang="en-US" sz="3600" dirty="0" err="1" smtClean="0"/>
-              <a:t>trung</a:t>
-            </a:r>
-            <a:r>
-              <a:rPr lang="en-US" sz="3600" dirty="0" smtClean="0"/>
-              <a:t> </a:t>
-            </a:r>
-            <a:r>
-              <a:rPr lang="en-US" sz="3600" dirty="0" err="1" smtClean="0"/>
-              <a:t>viết</a:t>
-            </a:r>
-            <a:r>
-              <a:rPr lang="en-US" sz="3600" dirty="0" smtClean="0"/>
-              <a:t> </a:t>
-            </a:r>
-            <a:r>
-              <a:rPr lang="en-US" sz="3600" dirty="0" err="1" smtClean="0"/>
-              <a:t>trong</a:t>
-            </a:r>
-            <a:r>
-              <a:rPr lang="en-US" sz="3600" dirty="0" smtClean="0"/>
-              <a:t> 2 </a:t>
-            </a:r>
-            <a:r>
-              <a:rPr lang="en-US" sz="3600" dirty="0" err="1" smtClean="0"/>
-              <a:t>câu</a:t>
-            </a:r>
-            <a:r>
-              <a:rPr lang="en-US" sz="3600" dirty="0" smtClean="0"/>
-              <a:t> </a:t>
-            </a:r>
-            <a:r>
-              <a:rPr lang="en-US" sz="3600" dirty="0" err="1" smtClean="0"/>
-              <a:t>lệnh</a:t>
-            </a:r>
-            <a:r>
-              <a:rPr lang="en-US" sz="3600" dirty="0" smtClean="0"/>
-              <a:t> </a:t>
-            </a:r>
-            <a:r>
-              <a:rPr lang="en-US" sz="3600" dirty="0" err="1" smtClean="0"/>
-              <a:t>trên</a:t>
-            </a:r>
-            <a:endParaRPr lang="en-US" sz="3600" dirty="0" smtClean="0"/>
-          </a:p>
-          <a:p>
-            <a:r>
-              <a:rPr lang="en-US" sz="3600" dirty="0" smtClean="0"/>
-              <a:t>Latex </a:t>
-            </a:r>
-            <a:r>
-              <a:rPr lang="en-US" sz="3600" dirty="0" err="1" smtClean="0"/>
-              <a:t>sử</a:t>
-            </a:r>
-            <a:r>
-              <a:rPr lang="en-US" sz="3600" dirty="0" smtClean="0"/>
-              <a:t> </a:t>
-            </a:r>
-            <a:r>
-              <a:rPr lang="en-US" sz="3600" dirty="0" err="1" smtClean="0"/>
-              <a:t>dụng</a:t>
-            </a:r>
-            <a:r>
-              <a:rPr lang="en-US" sz="3600" dirty="0" smtClean="0"/>
-              <a:t> comment </a:t>
-            </a:r>
-            <a:r>
-              <a:rPr lang="en-US" sz="3600" dirty="0" err="1" smtClean="0"/>
-              <a:t>là</a:t>
-            </a:r>
-            <a:r>
-              <a:rPr lang="en-US" sz="3600" dirty="0" smtClean="0"/>
-              <a:t> </a:t>
-            </a:r>
-            <a:r>
-              <a:rPr lang="en-US" sz="3600" dirty="0" err="1" smtClean="0"/>
-              <a:t>dấu</a:t>
-            </a:r>
-            <a:r>
-              <a:rPr lang="en-US" sz="3600" dirty="0" smtClean="0"/>
-              <a:t> %</a:t>
+              <a:rPr lang="vi-VN" sz="3600" dirty="0" smtClean="0"/>
+              <a:t>\date{Nội dung}</a:t>
             </a:r>
             <a:endParaRPr lang="vi-VN" sz="3600" dirty="0"/>
           </a:p>
@@ -7780,7 +7759,7 @@
     </p:spTree>
     <p:extLst>
       <p:ext uri="{BB962C8B-B14F-4D97-AF65-F5344CB8AC3E}">
-        <p14:creationId xmlns:p14="http://schemas.microsoft.com/office/powerpoint/2010/main" val="1893408388"/>
+        <p14:creationId xmlns:p14="http://schemas.microsoft.com/office/powerpoint/2010/main" val="196841316"/>
       </p:ext>
     </p:extLst>
   </p:cSld>
@@ -7980,6 +7959,101 @@
       </p:grpSpPr>
       <p:sp>
         <p:nvSpPr>
+          <p:cNvPr id="2" name="Title 1"/>
+          <p:cNvSpPr>
+            <a:spLocks noGrp="1"/>
+          </p:cNvSpPr>
+          <p:nvPr>
+            <p:ph type="title"/>
+          </p:nvPr>
+        </p:nvSpPr>
+        <p:spPr/>
+        <p:txBody>
+          <a:bodyPr/>
+          <a:lstStyle/>
+          <a:p>
+            <a:r>
+              <a:rPr lang="en-US" dirty="0" err="1" smtClean="0"/>
+              <a:t>Khai</a:t>
+            </a:r>
+            <a:r>
+              <a:rPr lang="en-US" dirty="0" smtClean="0"/>
+              <a:t> </a:t>
+            </a:r>
+            <a:r>
+              <a:rPr lang="en-US" dirty="0" err="1" smtClean="0"/>
+              <a:t>báo</a:t>
+            </a:r>
+            <a:r>
+              <a:rPr lang="en-US" dirty="0" smtClean="0"/>
+              <a:t> </a:t>
+            </a:r>
+            <a:r>
+              <a:rPr lang="en-US" dirty="0" err="1" smtClean="0"/>
+              <a:t>bắt</a:t>
+            </a:r>
+            <a:r>
+              <a:rPr lang="en-US" dirty="0" smtClean="0"/>
+              <a:t> </a:t>
+            </a:r>
+            <a:r>
+              <a:rPr lang="en-US" dirty="0" err="1" smtClean="0"/>
+              <a:t>đầu</a:t>
+            </a:r>
+            <a:r>
+              <a:rPr lang="en-US" dirty="0" smtClean="0"/>
+              <a:t> </a:t>
+            </a:r>
+            <a:r>
+              <a:rPr lang="en-US" dirty="0" err="1" smtClean="0"/>
+              <a:t>và</a:t>
+            </a:r>
+            <a:r>
+              <a:rPr lang="en-US" dirty="0" smtClean="0"/>
+              <a:t> </a:t>
+            </a:r>
+            <a:r>
+              <a:rPr lang="en-US" dirty="0" err="1" smtClean="0"/>
+              <a:t>kết</a:t>
+            </a:r>
+            <a:r>
+              <a:rPr lang="en-US" dirty="0" smtClean="0"/>
+              <a:t> </a:t>
+            </a:r>
+            <a:r>
+              <a:rPr lang="en-US" dirty="0" err="1" smtClean="0"/>
+              <a:t>thúc</a:t>
+            </a:r>
+            <a:r>
+              <a:rPr lang="en-US" dirty="0" smtClean="0"/>
+              <a:t> </a:t>
+            </a:r>
+            <a:r>
+              <a:rPr lang="en-US" dirty="0" err="1" smtClean="0"/>
+              <a:t>của</a:t>
+            </a:r>
+            <a:r>
+              <a:rPr lang="en-US" dirty="0" smtClean="0"/>
+              <a:t> </a:t>
+            </a:r>
+            <a:r>
+              <a:rPr lang="en-US" dirty="0" err="1" smtClean="0"/>
+              <a:t>văn</a:t>
+            </a:r>
+            <a:r>
+              <a:rPr lang="en-US" dirty="0" smtClean="0"/>
+              <a:t> </a:t>
+            </a:r>
+            <a:r>
+              <a:rPr lang="en-US" dirty="0" err="1" smtClean="0"/>
+              <a:t>bản</a:t>
+            </a:r>
+            <a:endParaRPr lang="vi-VN" dirty="0"/>
+          </a:p>
+        </p:txBody>
+      </p:sp>
+      <p:sp>
+        <p:nvSpPr>
           <p:cNvPr id="3" name="Content Placeholder 2"/>
           <p:cNvSpPr>
             <a:spLocks noGrp="1"/>
@@ -7990,8 +8064,8 @@
         </p:nvSpPr>
         <p:spPr>
           <a:xfrm>
-            <a:off x="793242" y="1593918"/>
-            <a:ext cx="9265157" cy="3880773"/>
+            <a:off x="1514460" y="1748465"/>
+            <a:ext cx="8596668" cy="3880773"/>
           </a:xfrm>
         </p:spPr>
         <p:txBody>
@@ -8004,47 +8078,220 @@
               <a:buNone/>
             </a:pPr>
             <a:r>
-              <a:rPr lang="vi-VN" sz="3600" dirty="0" smtClean="0"/>
-              <a:t>Để xuất tiêu đề , tên tác giả và ngày tháng , cám ơn đã được biết ở bước trước cần chèn đoạn lệnh sau:</a:t>
+              <a:rPr lang="en-US" sz="4400" dirty="0" smtClean="0">
+                <a:solidFill>
+                  <a:schemeClr val="tx1"/>
+                </a:solidFill>
+              </a:rPr>
+              <a:t>\begin{document}</a:t>
             </a:r>
           </a:p>
           <a:p>
             <a:pPr marL="0" indent="0">
               <a:buNone/>
             </a:pPr>
-            <a:r>
-              <a:rPr lang="vi-VN" sz="3600" dirty="0"/>
-              <a:t>\begin{titlepage</a:t>
-            </a:r>
-            <a:r>
-              <a:rPr lang="vi-VN" sz="3600" dirty="0" smtClean="0"/>
-              <a:t>}  %bat dau tieu de</a:t>
-            </a:r>
+            <a:endParaRPr lang="en-US" sz="4400" dirty="0" smtClean="0">
+              <a:solidFill>
+                <a:schemeClr val="tx1"/>
+              </a:solidFill>
+            </a:endParaRPr>
           </a:p>
           <a:p>
             <a:pPr marL="0" indent="0">
               <a:buNone/>
             </a:pPr>
             <a:r>
-              <a:rPr lang="vi-VN" sz="3600" dirty="0" smtClean="0"/>
-              <a:t>\maketitle %xuat ra tieu de</a:t>
-            </a:r>
-          </a:p>
-          <a:p>
-            <a:pPr marL="0" indent="0">
-              <a:buNone/>
-            </a:pPr>
-            <a:r>
-              <a:rPr lang="vi-VN" sz="3600" dirty="0" smtClean="0"/>
-              <a:t>\</a:t>
-            </a:r>
-            <a:r>
-              <a:rPr lang="vi-VN" sz="3600" dirty="0"/>
-              <a:t>end{titlepage</a:t>
-            </a:r>
-            <a:r>
-              <a:rPr lang="vi-VN" sz="3600" dirty="0" smtClean="0"/>
-              <a:t>}  %ket thuc tieu do</a:t>
+              <a:rPr lang="en-US" sz="4400" dirty="0" smtClean="0">
+                <a:solidFill>
+                  <a:schemeClr val="tx1"/>
+                </a:solidFill>
+              </a:rPr>
+              <a:t>\end{document}</a:t>
+            </a:r>
+            <a:endParaRPr lang="en-US" sz="4400" dirty="0">
+              <a:solidFill>
+                <a:schemeClr val="tx1"/>
+              </a:solidFill>
+            </a:endParaRPr>
+          </a:p>
+        </p:txBody>
+      </p:sp>
+      <p:sp>
+        <p:nvSpPr>
+          <p:cNvPr id="4" name="TextBox 3"/>
+          <p:cNvSpPr txBox="1"/>
+          <p:nvPr/>
+        </p:nvSpPr>
+        <p:spPr>
+          <a:xfrm>
+            <a:off x="677334" y="4616948"/>
+            <a:ext cx="7972022" cy="1754326"/>
+          </a:xfrm>
+          <a:prstGeom prst="rect">
+            <a:avLst/>
+          </a:prstGeom>
+          <a:noFill/>
+        </p:spPr>
+        <p:txBody>
+          <a:bodyPr wrap="square" rtlCol="0">
+            <a:spAutoFit/>
+          </a:bodyPr>
+          <a:lstStyle/>
+          <a:p>
+            <a:r>
+              <a:rPr lang="en-US" sz="3600" dirty="0" err="1" smtClean="0"/>
+              <a:t>Các</a:t>
+            </a:r>
+            <a:r>
+              <a:rPr lang="en-US" sz="3600" dirty="0" smtClean="0"/>
+              <a:t> </a:t>
+            </a:r>
+            <a:r>
+              <a:rPr lang="en-US" sz="3600" dirty="0" err="1" smtClean="0"/>
+              <a:t>lệnh</a:t>
+            </a:r>
+            <a:r>
+              <a:rPr lang="en-US" sz="3600" dirty="0" smtClean="0"/>
+              <a:t> </a:t>
+            </a:r>
+            <a:r>
+              <a:rPr lang="en-US" sz="3600" dirty="0" err="1" smtClean="0"/>
+              <a:t>và</a:t>
+            </a:r>
+            <a:r>
+              <a:rPr lang="en-US" sz="3600" dirty="0" smtClean="0"/>
+              <a:t> </a:t>
+            </a:r>
+            <a:r>
+              <a:rPr lang="en-US" sz="3600" dirty="0" err="1" smtClean="0"/>
+              <a:t>nội</a:t>
+            </a:r>
+            <a:r>
+              <a:rPr lang="en-US" sz="3600" dirty="0" smtClean="0"/>
+              <a:t> dung </a:t>
+            </a:r>
+            <a:r>
+              <a:rPr lang="en-US" sz="3600" dirty="0" err="1" smtClean="0"/>
+              <a:t>văn</a:t>
+            </a:r>
+            <a:r>
+              <a:rPr lang="en-US" sz="3600" dirty="0" smtClean="0"/>
+              <a:t> </a:t>
+            </a:r>
+            <a:r>
+              <a:rPr lang="en-US" sz="3600" dirty="0" err="1" smtClean="0"/>
+              <a:t>bản</a:t>
+            </a:r>
+            <a:r>
+              <a:rPr lang="en-US" sz="3600" dirty="0" smtClean="0"/>
+              <a:t> </a:t>
+            </a:r>
+            <a:r>
+              <a:rPr lang="en-US" sz="3600" dirty="0" err="1" smtClean="0"/>
+              <a:t>sẽ</a:t>
+            </a:r>
+            <a:r>
+              <a:rPr lang="en-US" sz="3600" dirty="0" smtClean="0"/>
+              <a:t> </a:t>
+            </a:r>
+            <a:r>
+              <a:rPr lang="en-US" sz="3600" dirty="0" err="1" smtClean="0"/>
+              <a:t>được</a:t>
+            </a:r>
+            <a:r>
+              <a:rPr lang="en-US" sz="3600" dirty="0" smtClean="0"/>
+              <a:t> </a:t>
+            </a:r>
+            <a:r>
+              <a:rPr lang="en-US" sz="3600" dirty="0" err="1" smtClean="0"/>
+              <a:t>tập</a:t>
+            </a:r>
+            <a:r>
+              <a:rPr lang="en-US" sz="3600" dirty="0" smtClean="0"/>
+              <a:t> </a:t>
+            </a:r>
+            <a:r>
+              <a:rPr lang="en-US" sz="3600" dirty="0" err="1" smtClean="0"/>
+              <a:t>trung</a:t>
+            </a:r>
+            <a:r>
+              <a:rPr lang="en-US" sz="3600" dirty="0" smtClean="0"/>
+              <a:t> </a:t>
+            </a:r>
+            <a:r>
+              <a:rPr lang="en-US" sz="3600" dirty="0" err="1" smtClean="0"/>
+              <a:t>viết</a:t>
+            </a:r>
+            <a:r>
+              <a:rPr lang="en-US" sz="3600" dirty="0" smtClean="0"/>
+              <a:t> </a:t>
+            </a:r>
+            <a:r>
+              <a:rPr lang="en-US" sz="3600" dirty="0" err="1" smtClean="0"/>
+              <a:t>trong</a:t>
+            </a:r>
+            <a:r>
+              <a:rPr lang="en-US" sz="3600" dirty="0" smtClean="0"/>
+              <a:t> 2 </a:t>
+            </a:r>
+            <a:r>
+              <a:rPr lang="en-US" sz="3600" dirty="0" err="1" smtClean="0"/>
+              <a:t>câu</a:t>
+            </a:r>
+            <a:r>
+              <a:rPr lang="en-US" sz="3600" dirty="0" smtClean="0"/>
+              <a:t> </a:t>
+            </a:r>
+            <a:r>
+              <a:rPr lang="en-US" sz="3600" dirty="0" err="1" smtClean="0"/>
+              <a:t>lệnh</a:t>
+            </a:r>
+            <a:r>
+              <a:rPr lang="en-US" sz="3600" dirty="0" smtClean="0"/>
+              <a:t> </a:t>
+            </a:r>
+            <a:r>
+              <a:rPr lang="en-US" sz="3600" dirty="0" err="1" smtClean="0"/>
+              <a:t>trên</a:t>
+            </a:r>
+            <a:endParaRPr lang="en-US" sz="3600" dirty="0" smtClean="0"/>
+          </a:p>
+          <a:p>
+            <a:r>
+              <a:rPr lang="en-US" sz="3600" dirty="0" smtClean="0"/>
+              <a:t>Latex </a:t>
+            </a:r>
+            <a:r>
+              <a:rPr lang="en-US" sz="3600" dirty="0" err="1" smtClean="0"/>
+              <a:t>sử</a:t>
+            </a:r>
+            <a:r>
+              <a:rPr lang="en-US" sz="3600" dirty="0" smtClean="0"/>
+              <a:t> </a:t>
+            </a:r>
+            <a:r>
+              <a:rPr lang="en-US" sz="3600" dirty="0" err="1" smtClean="0"/>
+              <a:t>dụng</a:t>
+            </a:r>
+            <a:r>
+              <a:rPr lang="en-US" sz="3600" dirty="0" smtClean="0"/>
+              <a:t> comment </a:t>
+            </a:r>
+            <a:r>
+              <a:rPr lang="en-US" sz="3600" dirty="0" err="1" smtClean="0"/>
+              <a:t>là</a:t>
+            </a:r>
+            <a:r>
+              <a:rPr lang="en-US" sz="3600" dirty="0" smtClean="0"/>
+              <a:t> </a:t>
+            </a:r>
+            <a:r>
+              <a:rPr lang="en-US" sz="3600" dirty="0" err="1" smtClean="0"/>
+              <a:t>dấu</a:t>
+            </a:r>
+            <a:r>
+              <a:rPr lang="en-US" sz="3600" dirty="0" smtClean="0"/>
+              <a:t> %</a:t>
             </a:r>
             <a:endParaRPr lang="vi-VN" sz="3600" dirty="0"/>
           </a:p>
@@ -8053,7 +8300,7 @@
     </p:spTree>
     <p:extLst>
       <p:ext uri="{BB962C8B-B14F-4D97-AF65-F5344CB8AC3E}">
-        <p14:creationId xmlns:p14="http://schemas.microsoft.com/office/powerpoint/2010/main" val="526868597"/>
+        <p14:creationId xmlns:p14="http://schemas.microsoft.com/office/powerpoint/2010/main" val="1893408388"/>
       </p:ext>
     </p:extLst>
   </p:cSld>
@@ -8082,6 +8329,108 @@
       </p:grpSpPr>
       <p:sp>
         <p:nvSpPr>
+          <p:cNvPr id="3" name="Content Placeholder 2"/>
+          <p:cNvSpPr>
+            <a:spLocks noGrp="1"/>
+          </p:cNvSpPr>
+          <p:nvPr>
+            <p:ph idx="1"/>
+          </p:nvPr>
+        </p:nvSpPr>
+        <p:spPr>
+          <a:xfrm>
+            <a:off x="793242" y="1593918"/>
+            <a:ext cx="9265157" cy="3880773"/>
+          </a:xfrm>
+        </p:spPr>
+        <p:txBody>
+          <a:bodyPr>
+            <a:normAutofit/>
+          </a:bodyPr>
+          <a:lstStyle/>
+          <a:p>
+            <a:pPr marL="0" indent="0">
+              <a:buNone/>
+            </a:pPr>
+            <a:r>
+              <a:rPr lang="vi-VN" sz="3600" dirty="0" smtClean="0"/>
+              <a:t>Để xuất tiêu đề , tên tác giả và ngày tháng , cám ơn đã được biết ở bước trước cần chèn đoạn lệnh sau:</a:t>
+            </a:r>
+          </a:p>
+          <a:p>
+            <a:pPr marL="0" indent="0">
+              <a:buNone/>
+            </a:pPr>
+            <a:r>
+              <a:rPr lang="vi-VN" sz="3600" dirty="0"/>
+              <a:t>\begin{titlepage</a:t>
+            </a:r>
+            <a:r>
+              <a:rPr lang="vi-VN" sz="3600" dirty="0" smtClean="0"/>
+              <a:t>}  %bat dau tieu de</a:t>
+            </a:r>
+          </a:p>
+          <a:p>
+            <a:pPr marL="0" indent="0">
+              <a:buNone/>
+            </a:pPr>
+            <a:r>
+              <a:rPr lang="vi-VN" sz="3600" dirty="0" smtClean="0"/>
+              <a:t>\maketitle %xuat ra tieu de</a:t>
+            </a:r>
+          </a:p>
+          <a:p>
+            <a:pPr marL="0" indent="0">
+              <a:buNone/>
+            </a:pPr>
+            <a:r>
+              <a:rPr lang="vi-VN" sz="3600" dirty="0" smtClean="0"/>
+              <a:t>\</a:t>
+            </a:r>
+            <a:r>
+              <a:rPr lang="vi-VN" sz="3600" dirty="0"/>
+              <a:t>end{titlepage</a:t>
+            </a:r>
+            <a:r>
+              <a:rPr lang="vi-VN" sz="3600" dirty="0" smtClean="0"/>
+              <a:t>}  %ket thuc tieu do</a:t>
+            </a:r>
+            <a:endParaRPr lang="vi-VN" sz="3600" dirty="0"/>
+          </a:p>
+        </p:txBody>
+      </p:sp>
+    </p:spTree>
+    <p:extLst>
+      <p:ext uri="{BB962C8B-B14F-4D97-AF65-F5344CB8AC3E}">
+        <p14:creationId xmlns:p14="http://schemas.microsoft.com/office/powerpoint/2010/main" val="526868597"/>
+      </p:ext>
+    </p:extLst>
+  </p:cSld>
+  <p:clrMapOvr>
+    <a:masterClrMapping/>
+  </p:clrMapOvr>
+</p:sld>
+</file>
+
+<file path=ppt/slides/slide22.xml><?xml version="1.0" encoding="utf-8"?>
+<p:sld xmlns:a="http://schemas.openxmlformats.org/drawingml/2006/main" xmlns:r="http://schemas.openxmlformats.org/officeDocument/2006/relationships" xmlns:p="http://schemas.openxmlformats.org/presentationml/2006/main">
+  <p:cSld>
+    <p:spTree>
+      <p:nvGrpSpPr>
+        <p:cNvPr id="1" name=""/>
+        <p:cNvGrpSpPr/>
+        <p:nvPr/>
+      </p:nvGrpSpPr>
+      <p:grpSpPr>
+        <a:xfrm>
+          <a:off x="0" y="0"/>
+          <a:ext cx="0" cy="0"/>
+          <a:chOff x="0" y="0"/>
+          <a:chExt cx="0" cy="0"/>
+        </a:xfrm>
+      </p:grpSpPr>
+      <p:sp>
+        <p:nvSpPr>
           <p:cNvPr id="2" name="Title 1"/>
           <p:cNvSpPr>
             <a:spLocks noGrp="1"/>
@@ -8257,7 +8606,7 @@
 </p:sld>
 </file>
 
-<file path=ppt/slides/slide22.xml><?xml version="1.0" encoding="utf-8"?>
+<file path=ppt/slides/slide23.xml><?xml version="1.0" encoding="utf-8"?>
 <p:sld xmlns:a="http://schemas.openxmlformats.org/drawingml/2006/main" xmlns:r="http://schemas.openxmlformats.org/officeDocument/2006/relationships" xmlns:p="http://schemas.openxmlformats.org/presentationml/2006/main">
   <p:cSld>
     <p:spTree>
@@ -8341,77 +8690,6 @@
 </p:sld>
 </file>
 
-<file path=ppt/slides/slide23.xml><?xml version="1.0" encoding="utf-8"?>
-<p:sld xmlns:a="http://schemas.openxmlformats.org/drawingml/2006/main" xmlns:r="http://schemas.openxmlformats.org/officeDocument/2006/relationships" xmlns:p="http://schemas.openxmlformats.org/presentationml/2006/main">
-  <p:cSld>
-    <p:spTree>
-      <p:nvGrpSpPr>
-        <p:cNvPr id="1" name=""/>
-        <p:cNvGrpSpPr/>
-        <p:nvPr/>
-      </p:nvGrpSpPr>
-      <p:grpSpPr>
-        <a:xfrm>
-          <a:off x="0" y="0"/>
-          <a:ext cx="0" cy="0"/>
-          <a:chOff x="0" y="0"/>
-          <a:chExt cx="0" cy="0"/>
-        </a:xfrm>
-      </p:grpSpPr>
-      <p:sp>
-        <p:nvSpPr>
-          <p:cNvPr id="3" name="Content Placeholder 2"/>
-          <p:cNvSpPr>
-            <a:spLocks noGrp="1"/>
-          </p:cNvSpPr>
-          <p:nvPr>
-            <p:ph idx="1"/>
-          </p:nvPr>
-        </p:nvSpPr>
-        <p:spPr>
-          <a:xfrm>
-            <a:off x="156346" y="2624229"/>
-            <a:ext cx="9638643" cy="3880773"/>
-          </a:xfrm>
-        </p:spPr>
-        <p:txBody>
-          <a:bodyPr>
-            <a:normAutofit/>
-          </a:bodyPr>
-          <a:lstStyle/>
-          <a:p>
-            <a:pPr marL="0" indent="0" algn="ctr">
-              <a:buNone/>
-            </a:pPr>
-            <a:r>
-              <a:rPr lang="vi-VN" sz="5400" b="1" dirty="0" smtClean="0">
-                <a:solidFill>
-                  <a:srgbClr val="92D050"/>
-                </a:solidFill>
-              </a:rPr>
-              <a:t>CÁM ƠN CÁC BẠN ĐÃ THEO DÕI BUỔI HỌC</a:t>
-            </a:r>
-            <a:endParaRPr lang="vi-VN" sz="5400" b="1" dirty="0">
-              <a:solidFill>
-                <a:srgbClr val="92D050"/>
-              </a:solidFill>
-            </a:endParaRPr>
-          </a:p>
-        </p:txBody>
-      </p:sp>
-    </p:spTree>
-    <p:extLst>
-      <p:ext uri="{BB962C8B-B14F-4D97-AF65-F5344CB8AC3E}">
-        <p14:creationId xmlns:p14="http://schemas.microsoft.com/office/powerpoint/2010/main" val="1985995013"/>
-      </p:ext>
-    </p:extLst>
-  </p:cSld>
-  <p:clrMapOvr>
-    <a:masterClrMapping/>
-  </p:clrMapOvr>
-</p:sld>
-</file>
-
 <file path=ppt/slides/slide24.xml><?xml version="1.0" encoding="utf-8"?>
 <p:sld xmlns:a="http://schemas.openxmlformats.org/drawingml/2006/main" xmlns:r="http://schemas.openxmlformats.org/officeDocument/2006/relationships" xmlns:p="http://schemas.openxmlformats.org/presentationml/2006/main">
   <p:cSld>
@@ -8431,6 +8709,77 @@
       </p:grpSpPr>
       <p:sp>
         <p:nvSpPr>
+          <p:cNvPr id="3" name="Content Placeholder 2"/>
+          <p:cNvSpPr>
+            <a:spLocks noGrp="1"/>
+          </p:cNvSpPr>
+          <p:nvPr>
+            <p:ph idx="1"/>
+          </p:nvPr>
+        </p:nvSpPr>
+        <p:spPr>
+          <a:xfrm>
+            <a:off x="156346" y="2624229"/>
+            <a:ext cx="9638643" cy="3880773"/>
+          </a:xfrm>
+        </p:spPr>
+        <p:txBody>
+          <a:bodyPr>
+            <a:normAutofit/>
+          </a:bodyPr>
+          <a:lstStyle/>
+          <a:p>
+            <a:pPr marL="0" indent="0" algn="ctr">
+              <a:buNone/>
+            </a:pPr>
+            <a:r>
+              <a:rPr lang="vi-VN" sz="5400" b="1" dirty="0" smtClean="0">
+                <a:solidFill>
+                  <a:srgbClr val="92D050"/>
+                </a:solidFill>
+              </a:rPr>
+              <a:t>CÁM ƠN CÁC BẠN ĐÃ THEO DÕI BUỔI HỌC</a:t>
+            </a:r>
+            <a:endParaRPr lang="vi-VN" sz="5400" b="1" dirty="0">
+              <a:solidFill>
+                <a:srgbClr val="92D050"/>
+              </a:solidFill>
+            </a:endParaRPr>
+          </a:p>
+        </p:txBody>
+      </p:sp>
+    </p:spTree>
+    <p:extLst>
+      <p:ext uri="{BB962C8B-B14F-4D97-AF65-F5344CB8AC3E}">
+        <p14:creationId xmlns:p14="http://schemas.microsoft.com/office/powerpoint/2010/main" val="1985995013"/>
+      </p:ext>
+    </p:extLst>
+  </p:cSld>
+  <p:clrMapOvr>
+    <a:masterClrMapping/>
+  </p:clrMapOvr>
+</p:sld>
+</file>
+
+<file path=ppt/slides/slide25.xml><?xml version="1.0" encoding="utf-8"?>
+<p:sld xmlns:a="http://schemas.openxmlformats.org/drawingml/2006/main" xmlns:r="http://schemas.openxmlformats.org/officeDocument/2006/relationships" xmlns:p="http://schemas.openxmlformats.org/presentationml/2006/main">
+  <p:cSld>
+    <p:spTree>
+      <p:nvGrpSpPr>
+        <p:cNvPr id="1" name=""/>
+        <p:cNvGrpSpPr/>
+        <p:nvPr/>
+      </p:nvGrpSpPr>
+      <p:grpSpPr>
+        <a:xfrm>
+          <a:off x="0" y="0"/>
+          <a:ext cx="0" cy="0"/>
+          <a:chOff x="0" y="0"/>
+          <a:chExt cx="0" cy="0"/>
+        </a:xfrm>
+      </p:grpSpPr>
+      <p:sp>
+        <p:nvSpPr>
           <p:cNvPr id="2" name="Title 1"/>
           <p:cNvSpPr>
             <a:spLocks noGrp="1"/>
@@ -8527,9 +8876,39 @@
                 <a:solidFill>
                   <a:srgbClr val="92D050"/>
                 </a:solidFill>
+                <a:hlinkClick r:id="rId3"/>
               </a:rPr>
-              <a:t>https://phamanhvinh.wordpress.com/2017/04/10/latex-bai-1-soan-thao-trong-latex/</a:t>
-            </a:r>
+              <a:t>https://phamanhvinh.wordpress.com/2017/04/10/latex-bai-1-soan-thao-trong-latex</a:t>
+            </a:r>
+            <a:r>
+              <a:rPr lang="vi-VN" sz="2800" i="1" u="sng" dirty="0" smtClean="0">
+                <a:solidFill>
+                  <a:srgbClr val="92D050"/>
+                </a:solidFill>
+                <a:hlinkClick r:id="rId3"/>
+              </a:rPr>
+              <a:t>/</a:t>
+            </a:r>
+            <a:endParaRPr lang="vi-VN" sz="2800" i="1" u="sng" dirty="0" smtClean="0">
+              <a:solidFill>
+                <a:srgbClr val="92D050"/>
+              </a:solidFill>
+            </a:endParaRPr>
+          </a:p>
+          <a:p>
+            <a:r>
+              <a:rPr lang="vi-VN" sz="2800" i="1" u="sng" dirty="0">
+                <a:solidFill>
+                  <a:srgbClr val="92D050"/>
+                </a:solidFill>
+              </a:rPr>
+              <a:t>https://blogchiasekienthuc.com/thu-thuat-hay/soan-thao-van-ban-voi-latex.html</a:t>
+            </a:r>
+            <a:endParaRPr lang="vi-VN" sz="2800" i="1" u="sng" dirty="0">
+              <a:solidFill>
+                <a:srgbClr val="92D050"/>
+              </a:solidFill>
+            </a:endParaRPr>
           </a:p>
         </p:txBody>
       </p:sp>

</xml_diff>

<commit_message>
cap nhat noi dung bai 1
</commit_message>
<xml_diff>
--- a/Bài 1/LATEX CƠ BẢN - Bài 1.pptx
+++ b/Bài 1/LATEX CƠ BẢN - Bài 1.pptx
@@ -28,8 +28,15 @@
     <p:sldId id="278" r:id="rId22"/>
     <p:sldId id="273" r:id="rId23"/>
     <p:sldId id="279" r:id="rId24"/>
-    <p:sldId id="281" r:id="rId25"/>
-    <p:sldId id="280" r:id="rId26"/>
+    <p:sldId id="287" r:id="rId25"/>
+    <p:sldId id="283" r:id="rId26"/>
+    <p:sldId id="284" r:id="rId27"/>
+    <p:sldId id="285" r:id="rId28"/>
+    <p:sldId id="286" r:id="rId29"/>
+    <p:sldId id="288" r:id="rId30"/>
+    <p:sldId id="289" r:id="rId31"/>
+    <p:sldId id="281" r:id="rId32"/>
+    <p:sldId id="280" r:id="rId33"/>
   </p:sldIdLst>
   <p:sldSz cx="12192000" cy="6858000"/>
   <p:notesSz cx="6858000" cy="9144000"/>
@@ -858,7 +865,7 @@
           <a:p>
             <a:fld id="{C0F77542-EEBF-4180-89BA-8813A26235EF}" type="datetimeFigureOut">
               <a:rPr lang="vi-VN" smtClean="0"/>
-              <a:t>21/05/2021</a:t>
+              <a:t>22/05/2021</a:t>
             </a:fld>
             <a:endParaRPr lang="vi-VN"/>
           </a:p>
@@ -1109,7 +1116,7 @@
           <a:p>
             <a:fld id="{C0F77542-EEBF-4180-89BA-8813A26235EF}" type="datetimeFigureOut">
               <a:rPr lang="vi-VN" smtClean="0"/>
-              <a:t>21/05/2021</a:t>
+              <a:t>22/05/2021</a:t>
             </a:fld>
             <a:endParaRPr lang="vi-VN"/>
           </a:p>
@@ -1423,7 +1430,7 @@
           <a:p>
             <a:fld id="{C0F77542-EEBF-4180-89BA-8813A26235EF}" type="datetimeFigureOut">
               <a:rPr lang="vi-VN" smtClean="0"/>
-              <a:t>21/05/2021</a:t>
+              <a:t>22/05/2021</a:t>
             </a:fld>
             <a:endParaRPr lang="vi-VN"/>
           </a:p>
@@ -1764,7 +1771,7 @@
           <a:p>
             <a:fld id="{C0F77542-EEBF-4180-89BA-8813A26235EF}" type="datetimeFigureOut">
               <a:rPr lang="vi-VN" smtClean="0"/>
-              <a:t>21/05/2021</a:t>
+              <a:t>22/05/2021</a:t>
             </a:fld>
             <a:endParaRPr lang="vi-VN"/>
           </a:p>
@@ -2078,7 +2085,7 @@
           <a:p>
             <a:fld id="{C0F77542-EEBF-4180-89BA-8813A26235EF}" type="datetimeFigureOut">
               <a:rPr lang="vi-VN" smtClean="0"/>
-              <a:t>21/05/2021</a:t>
+              <a:t>22/05/2021</a:t>
             </a:fld>
             <a:endParaRPr lang="vi-VN"/>
           </a:p>
@@ -2471,7 +2478,7 @@
           <a:p>
             <a:fld id="{C0F77542-EEBF-4180-89BA-8813A26235EF}" type="datetimeFigureOut">
               <a:rPr lang="vi-VN" smtClean="0"/>
-              <a:t>21/05/2021</a:t>
+              <a:t>22/05/2021</a:t>
             </a:fld>
             <a:endParaRPr lang="vi-VN"/>
           </a:p>
@@ -2641,7 +2648,7 @@
           <a:p>
             <a:fld id="{C0F77542-EEBF-4180-89BA-8813A26235EF}" type="datetimeFigureOut">
               <a:rPr lang="vi-VN" smtClean="0"/>
-              <a:t>21/05/2021</a:t>
+              <a:t>22/05/2021</a:t>
             </a:fld>
             <a:endParaRPr lang="vi-VN"/>
           </a:p>
@@ -2821,7 +2828,7 @@
           <a:p>
             <a:fld id="{C0F77542-EEBF-4180-89BA-8813A26235EF}" type="datetimeFigureOut">
               <a:rPr lang="vi-VN" smtClean="0"/>
-              <a:t>21/05/2021</a:t>
+              <a:t>22/05/2021</a:t>
             </a:fld>
             <a:endParaRPr lang="vi-VN"/>
           </a:p>
@@ -2997,7 +3004,7 @@
           <a:p>
             <a:fld id="{C0F77542-EEBF-4180-89BA-8813A26235EF}" type="datetimeFigureOut">
               <a:rPr lang="vi-VN" smtClean="0"/>
-              <a:t>21/05/2021</a:t>
+              <a:t>22/05/2021</a:t>
             </a:fld>
             <a:endParaRPr lang="vi-VN"/>
           </a:p>
@@ -3244,7 +3251,7 @@
           <a:p>
             <a:fld id="{C0F77542-EEBF-4180-89BA-8813A26235EF}" type="datetimeFigureOut">
               <a:rPr lang="vi-VN" smtClean="0"/>
-              <a:t>21/05/2021</a:t>
+              <a:t>22/05/2021</a:t>
             </a:fld>
             <a:endParaRPr lang="vi-VN"/>
           </a:p>
@@ -3476,7 +3483,7 @@
           <a:p>
             <a:fld id="{C0F77542-EEBF-4180-89BA-8813A26235EF}" type="datetimeFigureOut">
               <a:rPr lang="vi-VN" smtClean="0"/>
-              <a:t>21/05/2021</a:t>
+              <a:t>22/05/2021</a:t>
             </a:fld>
             <a:endParaRPr lang="vi-VN"/>
           </a:p>
@@ -3850,7 +3857,7 @@
           <a:p>
             <a:fld id="{C0F77542-EEBF-4180-89BA-8813A26235EF}" type="datetimeFigureOut">
               <a:rPr lang="vi-VN" smtClean="0"/>
-              <a:t>21/05/2021</a:t>
+              <a:t>22/05/2021</a:t>
             </a:fld>
             <a:endParaRPr lang="vi-VN"/>
           </a:p>
@@ -3973,7 +3980,7 @@
           <a:p>
             <a:fld id="{C0F77542-EEBF-4180-89BA-8813A26235EF}" type="datetimeFigureOut">
               <a:rPr lang="vi-VN" smtClean="0"/>
-              <a:t>21/05/2021</a:t>
+              <a:t>22/05/2021</a:t>
             </a:fld>
             <a:endParaRPr lang="vi-VN"/>
           </a:p>
@@ -4068,7 +4075,7 @@
           <a:p>
             <a:fld id="{C0F77542-EEBF-4180-89BA-8813A26235EF}" type="datetimeFigureOut">
               <a:rPr lang="vi-VN" smtClean="0"/>
-              <a:t>21/05/2021</a:t>
+              <a:t>22/05/2021</a:t>
             </a:fld>
             <a:endParaRPr lang="vi-VN"/>
           </a:p>
@@ -4323,7 +4330,7 @@
           <a:p>
             <a:fld id="{C0F77542-EEBF-4180-89BA-8813A26235EF}" type="datetimeFigureOut">
               <a:rPr lang="vi-VN" smtClean="0"/>
-              <a:t>21/05/2021</a:t>
+              <a:t>22/05/2021</a:t>
             </a:fld>
             <a:endParaRPr lang="vi-VN"/>
           </a:p>
@@ -4586,7 +4593,7 @@
           <a:p>
             <a:fld id="{C0F77542-EEBF-4180-89BA-8813A26235EF}" type="datetimeFigureOut">
               <a:rPr lang="vi-VN" smtClean="0"/>
-              <a:t>21/05/2021</a:t>
+              <a:t>22/05/2021</a:t>
             </a:fld>
             <a:endParaRPr lang="vi-VN"/>
           </a:p>
@@ -5329,7 +5336,7 @@
           <a:p>
             <a:fld id="{C0F77542-EEBF-4180-89BA-8813A26235EF}" type="datetimeFigureOut">
               <a:rPr lang="vi-VN" smtClean="0"/>
-              <a:t>21/05/2021</a:t>
+              <a:t>22/05/2021</a:t>
             </a:fld>
             <a:endParaRPr lang="vi-VN"/>
           </a:p>
@@ -7004,11 +7011,7 @@
           <a:p>
             <a:r>
               <a:rPr lang="vi-VN" sz="2400" dirty="0" smtClean="0"/>
-              <a:t>Các lệnh LaTeX được khai báo sau dấu \ (splash</a:t>
-            </a:r>
-            <a:r>
-              <a:rPr lang="vi-VN" sz="2400" dirty="0" smtClean="0"/>
-              <a:t>)</a:t>
+              <a:t>Các lệnh LaTeX được khai báo sau dấu \ (splash)</a:t>
             </a:r>
           </a:p>
           <a:p>
@@ -7044,7 +7047,6 @@
               <a:rPr lang="vi-VN" sz="2400" dirty="0" smtClean="0"/>
               <a:t>sách</a:t>
             </a:r>
-            <a:endParaRPr lang="vi-VN" sz="2400" dirty="0" smtClean="0"/>
           </a:p>
           <a:p>
             <a:pPr marL="0" indent="0">
@@ -8515,11 +8517,11 @@
             </a:pPr>
             <a:r>
               <a:rPr lang="vi-VN" dirty="0" smtClean="0"/>
-              <a:t>\author{Hubert Farnsworth \thanks{</a:t>
-            </a:r>
-            <a:r>
-              <a:rPr lang="en-US" dirty="0" smtClean="0"/>
-              <a:t>funded by </a:t>
+              <a:t>\author{Hubert Farnsworth \</a:t>
+            </a:r>
+            <a:r>
+              <a:rPr lang="vi-VN" dirty="0" smtClean="0"/>
+              <a:t>thanks{</a:t>
             </a:r>
             <a:r>
               <a:rPr lang="en-US" dirty="0" err="1" smtClean="0"/>
@@ -8709,18 +8711,46 @@
       </p:grpSpPr>
       <p:sp>
         <p:nvSpPr>
-          <p:cNvPr id="3" name="Content Placeholder 2"/>
-          <p:cNvSpPr>
-            <a:spLocks noGrp="1"/>
-          </p:cNvSpPr>
-          <p:nvPr>
-            <p:ph idx="1"/>
+          <p:cNvPr id="2" name="Title 1"/>
+          <p:cNvSpPr>
+            <a:spLocks noGrp="1"/>
+          </p:cNvSpPr>
+          <p:nvPr>
+            <p:ph type="title"/>
           </p:nvPr>
         </p:nvSpPr>
         <p:spPr>
           <a:xfrm>
-            <a:off x="156346" y="2624229"/>
-            <a:ext cx="9638643" cy="3880773"/>
+            <a:off x="677334" y="1150512"/>
+            <a:ext cx="8596668" cy="1320800"/>
+          </a:xfrm>
+        </p:spPr>
+        <p:txBody>
+          <a:bodyPr/>
+          <a:lstStyle/>
+          <a:p>
+            <a:r>
+              <a:rPr lang="vi-VN" dirty="0" smtClean="0"/>
+              <a:t>Lệnh ngắt trang</a:t>
+            </a:r>
+            <a:endParaRPr lang="vi-VN" dirty="0"/>
+          </a:p>
+        </p:txBody>
+      </p:sp>
+      <p:sp>
+        <p:nvSpPr>
+          <p:cNvPr id="3" name="Content Placeholder 2"/>
+          <p:cNvSpPr>
+            <a:spLocks noGrp="1"/>
+          </p:cNvSpPr>
+          <p:nvPr>
+            <p:ph idx="1"/>
+          </p:nvPr>
+        </p:nvSpPr>
+        <p:spPr>
+          <a:xfrm>
+            <a:off x="677334" y="2706771"/>
+            <a:ext cx="8596668" cy="3880773"/>
           </a:xfrm>
         </p:spPr>
         <p:txBody>
@@ -8733,25 +8763,17 @@
               <a:buNone/>
             </a:pPr>
             <a:r>
-              <a:rPr lang="vi-VN" sz="5400" b="1" dirty="0" smtClean="0">
-                <a:solidFill>
-                  <a:srgbClr val="92D050"/>
-                </a:solidFill>
-              </a:rPr>
-              <a:t>CÁM ƠN CÁC BẠN ĐÃ THEO DÕI BUỔI HỌC</a:t>
-            </a:r>
-            <a:endParaRPr lang="vi-VN" sz="5400" b="1" dirty="0">
-              <a:solidFill>
-                <a:srgbClr val="92D050"/>
-              </a:solidFill>
-            </a:endParaRPr>
+              <a:rPr lang="vi-VN" sz="4000" b="1" dirty="0" smtClean="0"/>
+              <a:t>\newpage</a:t>
+            </a:r>
+            <a:endParaRPr lang="vi-VN" sz="4000" b="1" dirty="0"/>
           </a:p>
         </p:txBody>
       </p:sp>
     </p:spTree>
     <p:extLst>
       <p:ext uri="{BB962C8B-B14F-4D97-AF65-F5344CB8AC3E}">
-        <p14:creationId xmlns:p14="http://schemas.microsoft.com/office/powerpoint/2010/main" val="1985995013"/>
+        <p14:creationId xmlns:p14="http://schemas.microsoft.com/office/powerpoint/2010/main" val="3977023064"/>
       </p:ext>
     </p:extLst>
   </p:cSld>
@@ -8780,17 +8802,485 @@
       </p:grpSpPr>
       <p:sp>
         <p:nvSpPr>
-          <p:cNvPr id="2" name="Title 1"/>
+          <p:cNvPr id="4" name="Title 3"/>
           <p:cNvSpPr>
             <a:spLocks noGrp="1"/>
           </p:cNvSpPr>
           <p:nvPr>
             <p:ph type="title"/>
           </p:nvPr>
+        </p:nvSpPr>
+        <p:spPr/>
+        <p:txBody>
+          <a:bodyPr/>
+          <a:lstStyle/>
+          <a:p>
+            <a:r>
+              <a:rPr lang="vi-VN" dirty="0" smtClean="0"/>
+              <a:t>Lệnh </a:t>
+            </a:r>
+            <a:r>
+              <a:rPr lang="vi-VN" dirty="0"/>
+              <a:t>\pagestyle{kiểu}</a:t>
+            </a:r>
+            <a:endParaRPr lang="vi-VN" dirty="0"/>
+          </a:p>
+        </p:txBody>
+      </p:sp>
+      <p:sp>
+        <p:nvSpPr>
+          <p:cNvPr id="5" name="TextBox 4"/>
+          <p:cNvSpPr txBox="1"/>
+          <p:nvPr/>
         </p:nvSpPr>
         <p:spPr>
           <a:xfrm>
-            <a:off x="691426" y="738389"/>
+            <a:off x="579550" y="2343955"/>
+            <a:ext cx="9878096" cy="2677656"/>
+          </a:xfrm>
+          <a:prstGeom prst="rect">
+            <a:avLst/>
+          </a:prstGeom>
+          <a:noFill/>
+        </p:spPr>
+        <p:txBody>
+          <a:bodyPr wrap="square" rtlCol="0">
+            <a:spAutoFit/>
+          </a:bodyPr>
+          <a:lstStyle/>
+          <a:p>
+            <a:r>
+              <a:rPr lang="vi-VN" sz="2800" b="1" dirty="0"/>
+              <a:t>plain</a:t>
+            </a:r>
+            <a:r>
+              <a:rPr lang="vi-VN" sz="2800" dirty="0"/>
+              <a:t> đánh và xuất số trang ở giữa phần chân ở cuối trang văn bản. Đây là kiểu định dạng mặc định.</a:t>
+            </a:r>
+          </a:p>
+          <a:p>
+            <a:r>
+              <a:rPr lang="vi-VN" sz="2800" b="1" dirty="0"/>
+              <a:t>headings</a:t>
+            </a:r>
+            <a:r>
+              <a:rPr lang="vi-VN" sz="2800" dirty="0"/>
+              <a:t> xuất tiêu đề của chương hiện tại và số thứ tự của trang văn bản ở vùng tiêu đề của trang; đồng thời, phần chân của trang được để trống.</a:t>
+            </a:r>
+          </a:p>
+          <a:p>
+            <a:r>
+              <a:rPr lang="vi-VN" sz="2800" b="1" dirty="0"/>
+              <a:t>empty</a:t>
+            </a:r>
+            <a:r>
+              <a:rPr lang="vi-VN" sz="2800" dirty="0"/>
+              <a:t> đặt cả phần tiêu đề và phân chân của trang là rỗng.</a:t>
+            </a:r>
+          </a:p>
+        </p:txBody>
+      </p:sp>
+    </p:spTree>
+    <p:extLst>
+      <p:ext uri="{BB962C8B-B14F-4D97-AF65-F5344CB8AC3E}">
+        <p14:creationId xmlns:p14="http://schemas.microsoft.com/office/powerpoint/2010/main" val="438025784"/>
+      </p:ext>
+    </p:extLst>
+  </p:cSld>
+  <p:clrMapOvr>
+    <a:masterClrMapping/>
+  </p:clrMapOvr>
+</p:sld>
+</file>
+
+<file path=ppt/slides/slide26.xml><?xml version="1.0" encoding="utf-8"?>
+<p:sld xmlns:a="http://schemas.openxmlformats.org/drawingml/2006/main" xmlns:r="http://schemas.openxmlformats.org/officeDocument/2006/relationships" xmlns:p="http://schemas.openxmlformats.org/presentationml/2006/main">
+  <p:cSld>
+    <p:spTree>
+      <p:nvGrpSpPr>
+        <p:cNvPr id="1" name=""/>
+        <p:cNvGrpSpPr/>
+        <p:nvPr/>
+      </p:nvGrpSpPr>
+      <p:grpSpPr>
+        <a:xfrm>
+          <a:off x="0" y="0"/>
+          <a:ext cx="0" cy="0"/>
+          <a:chOff x="0" y="0"/>
+          <a:chExt cx="0" cy="0"/>
+        </a:xfrm>
+      </p:grpSpPr>
+      <p:sp>
+        <p:nvSpPr>
+          <p:cNvPr id="2" name="Title 1"/>
+          <p:cNvSpPr>
+            <a:spLocks noGrp="1"/>
+          </p:cNvSpPr>
+          <p:nvPr>
+            <p:ph type="title"/>
+          </p:nvPr>
+        </p:nvSpPr>
+        <p:spPr/>
+        <p:txBody>
+          <a:bodyPr/>
+          <a:lstStyle/>
+          <a:p>
+            <a:r>
+              <a:rPr lang="en-US" dirty="0" smtClean="0">
+                <a:latin typeface="Arial" panose="020B0604020202020204" pitchFamily="34" charset="0"/>
+                <a:cs typeface="Arial" panose="020B0604020202020204" pitchFamily="34" charset="0"/>
+              </a:rPr>
+              <a:t>HIỆN TÊN CHAPTER TRÊN ĐẦU TRANG</a:t>
+            </a:r>
+            <a:endParaRPr lang="vi-VN" dirty="0">
+              <a:latin typeface="Arial" panose="020B0604020202020204" pitchFamily="34" charset="0"/>
+              <a:cs typeface="Arial" panose="020B0604020202020204" pitchFamily="34" charset="0"/>
+            </a:endParaRPr>
+          </a:p>
+        </p:txBody>
+      </p:sp>
+      <p:sp>
+        <p:nvSpPr>
+          <p:cNvPr id="3" name="Content Placeholder 2"/>
+          <p:cNvSpPr>
+            <a:spLocks noGrp="1"/>
+          </p:cNvSpPr>
+          <p:nvPr>
+            <p:ph idx="1"/>
+          </p:nvPr>
+        </p:nvSpPr>
+        <p:spPr>
+          <a:xfrm>
+            <a:off x="677334" y="2186346"/>
+            <a:ext cx="8596668" cy="3880773"/>
+          </a:xfrm>
+        </p:spPr>
+        <p:txBody>
+          <a:bodyPr>
+            <a:normAutofit fontScale="92500" lnSpcReduction="10000"/>
+          </a:bodyPr>
+          <a:lstStyle/>
+          <a:p>
+            <a:pPr marL="0" indent="0">
+              <a:buNone/>
+            </a:pPr>
+            <a:r>
+              <a:rPr lang="vi-VN" sz="4000" dirty="0" smtClean="0"/>
+              <a:t>%Chi doi voi dang book</a:t>
+            </a:r>
+          </a:p>
+          <a:p>
+            <a:pPr marL="0" indent="0">
+              <a:buNone/>
+            </a:pPr>
+            <a:r>
+              <a:rPr lang="vi-VN" sz="4000" dirty="0" smtClean="0"/>
+              <a:t>\pagestyle{headings}</a:t>
+            </a:r>
+          </a:p>
+          <a:p>
+            <a:pPr marL="0" indent="0">
+              <a:buNone/>
+            </a:pPr>
+            <a:endParaRPr lang="vi-VN" sz="4000" dirty="0"/>
+          </a:p>
+          <a:p>
+            <a:pPr marL="0" indent="0">
+              <a:buNone/>
+            </a:pPr>
+            <a:r>
+              <a:rPr lang="vi-VN" sz="4000" dirty="0" smtClean="0"/>
+              <a:t>\begin{document}</a:t>
+            </a:r>
+          </a:p>
+          <a:p>
+            <a:pPr marL="0" indent="0">
+              <a:buNone/>
+            </a:pPr>
+            <a:r>
+              <a:rPr lang="vi-VN" sz="4000" dirty="0" smtClean="0"/>
+              <a:t>	\chapter{tên chaper}</a:t>
+            </a:r>
+            <a:endParaRPr lang="vi-VN" sz="4000" dirty="0"/>
+          </a:p>
+          <a:p>
+            <a:pPr marL="0" indent="0">
+              <a:buNone/>
+            </a:pPr>
+            <a:r>
+              <a:rPr lang="vi-VN" sz="4000" dirty="0" smtClean="0"/>
+              <a:t>\end{document}</a:t>
+            </a:r>
+          </a:p>
+          <a:p>
+            <a:pPr marL="0" indent="0">
+              <a:buNone/>
+            </a:pPr>
+            <a:endParaRPr lang="vi-VN" sz="4000" dirty="0"/>
+          </a:p>
+        </p:txBody>
+      </p:sp>
+    </p:spTree>
+    <p:extLst>
+      <p:ext uri="{BB962C8B-B14F-4D97-AF65-F5344CB8AC3E}">
+        <p14:creationId xmlns:p14="http://schemas.microsoft.com/office/powerpoint/2010/main" val="3333059549"/>
+      </p:ext>
+    </p:extLst>
+  </p:cSld>
+  <p:clrMapOvr>
+    <a:masterClrMapping/>
+  </p:clrMapOvr>
+</p:sld>
+</file>
+
+<file path=ppt/slides/slide27.xml><?xml version="1.0" encoding="utf-8"?>
+<p:sld xmlns:a="http://schemas.openxmlformats.org/drawingml/2006/main" xmlns:r="http://schemas.openxmlformats.org/officeDocument/2006/relationships" xmlns:p="http://schemas.openxmlformats.org/presentationml/2006/main">
+  <p:cSld>
+    <p:spTree>
+      <p:nvGrpSpPr>
+        <p:cNvPr id="1" name=""/>
+        <p:cNvGrpSpPr/>
+        <p:nvPr/>
+      </p:nvGrpSpPr>
+      <p:grpSpPr>
+        <a:xfrm>
+          <a:off x="0" y="0"/>
+          <a:ext cx="0" cy="0"/>
+          <a:chOff x="0" y="0"/>
+          <a:chExt cx="0" cy="0"/>
+        </a:xfrm>
+      </p:grpSpPr>
+      <p:pic>
+        <p:nvPicPr>
+          <p:cNvPr id="4" name="Picture 3"/>
+          <p:cNvPicPr>
+            <a:picLocks noChangeAspect="1"/>
+          </p:cNvPicPr>
+          <p:nvPr/>
+        </p:nvPicPr>
+        <p:blipFill>
+          <a:blip r:embed="rId2"/>
+          <a:stretch>
+            <a:fillRect/>
+          </a:stretch>
+        </p:blipFill>
+        <p:spPr>
+          <a:xfrm>
+            <a:off x="737644" y="1124238"/>
+            <a:ext cx="4200000" cy="4609524"/>
+          </a:xfrm>
+          <a:prstGeom prst="rect">
+            <a:avLst/>
+          </a:prstGeom>
+        </p:spPr>
+      </p:pic>
+      <p:pic>
+        <p:nvPicPr>
+          <p:cNvPr id="5" name="Picture 4"/>
+          <p:cNvPicPr>
+            <a:picLocks noChangeAspect="1"/>
+          </p:cNvPicPr>
+          <p:nvPr/>
+        </p:nvPicPr>
+        <p:blipFill>
+          <a:blip r:embed="rId3"/>
+          <a:stretch>
+            <a:fillRect/>
+          </a:stretch>
+        </p:blipFill>
+        <p:spPr>
+          <a:xfrm>
+            <a:off x="5085404" y="1124238"/>
+            <a:ext cx="4689660" cy="4942857"/>
+          </a:xfrm>
+          <a:prstGeom prst="rect">
+            <a:avLst/>
+          </a:prstGeom>
+        </p:spPr>
+      </p:pic>
+    </p:spTree>
+    <p:extLst>
+      <p:ext uri="{BB962C8B-B14F-4D97-AF65-F5344CB8AC3E}">
+        <p14:creationId xmlns:p14="http://schemas.microsoft.com/office/powerpoint/2010/main" val="9562305"/>
+      </p:ext>
+    </p:extLst>
+  </p:cSld>
+  <p:clrMapOvr>
+    <a:masterClrMapping/>
+  </p:clrMapOvr>
+</p:sld>
+</file>
+
+<file path=ppt/slides/slide28.xml><?xml version="1.0" encoding="utf-8"?>
+<p:sld xmlns:a="http://schemas.openxmlformats.org/drawingml/2006/main" xmlns:r="http://schemas.openxmlformats.org/officeDocument/2006/relationships" xmlns:p="http://schemas.openxmlformats.org/presentationml/2006/main">
+  <p:cSld>
+    <p:spTree>
+      <p:nvGrpSpPr>
+        <p:cNvPr id="1" name=""/>
+        <p:cNvGrpSpPr/>
+        <p:nvPr/>
+      </p:nvGrpSpPr>
+      <p:grpSpPr>
+        <a:xfrm>
+          <a:off x="0" y="0"/>
+          <a:ext cx="0" cy="0"/>
+          <a:chOff x="0" y="0"/>
+          <a:chExt cx="0" cy="0"/>
+        </a:xfrm>
+      </p:grpSpPr>
+      <p:sp>
+        <p:nvSpPr>
+          <p:cNvPr id="2" name="Title 1"/>
+          <p:cNvSpPr>
+            <a:spLocks noGrp="1"/>
+          </p:cNvSpPr>
+          <p:nvPr>
+            <p:ph type="title"/>
+          </p:nvPr>
+        </p:nvSpPr>
+        <p:spPr/>
+        <p:txBody>
+          <a:bodyPr/>
+          <a:lstStyle/>
+          <a:p>
+            <a:r>
+              <a:rPr lang="vi-VN" dirty="0" smtClean="0"/>
+              <a:t>Custom thanh header bằng gói </a:t>
+            </a:r>
+            <a:endParaRPr lang="vi-VN" dirty="0"/>
+          </a:p>
+        </p:txBody>
+      </p:sp>
+      <p:sp>
+        <p:nvSpPr>
+          <p:cNvPr id="3" name="Content Placeholder 2"/>
+          <p:cNvSpPr>
+            <a:spLocks noGrp="1"/>
+          </p:cNvSpPr>
+          <p:nvPr>
+            <p:ph idx="1"/>
+          </p:nvPr>
+        </p:nvSpPr>
+        <p:spPr>
+          <a:xfrm>
+            <a:off x="2506133" y="1930400"/>
+            <a:ext cx="8596668" cy="3880773"/>
+          </a:xfrm>
+        </p:spPr>
+        <p:txBody>
+          <a:bodyPr>
+            <a:normAutofit/>
+          </a:bodyPr>
+          <a:lstStyle/>
+          <a:p>
+            <a:pPr marL="0" indent="0">
+              <a:buNone/>
+            </a:pPr>
+            <a:r>
+              <a:rPr lang="vi-VN" sz="3600" b="1" dirty="0" smtClean="0"/>
+              <a:t>\usepackage{fancyhdr}</a:t>
+            </a:r>
+            <a:endParaRPr lang="vi-VN" sz="3600" b="1" dirty="0"/>
+          </a:p>
+        </p:txBody>
+      </p:sp>
+      <p:sp>
+        <p:nvSpPr>
+          <p:cNvPr id="5" name="TextBox 4"/>
+          <p:cNvSpPr txBox="1"/>
+          <p:nvPr/>
+        </p:nvSpPr>
+        <p:spPr>
+          <a:xfrm>
+            <a:off x="631065" y="3026535"/>
+            <a:ext cx="7753081" cy="2308324"/>
+          </a:xfrm>
+          <a:prstGeom prst="rect">
+            <a:avLst/>
+          </a:prstGeom>
+          <a:noFill/>
+        </p:spPr>
+        <p:txBody>
+          <a:bodyPr wrap="square" rtlCol="0">
+            <a:spAutoFit/>
+          </a:bodyPr>
+          <a:lstStyle/>
+          <a:p>
+            <a:r>
+              <a:rPr lang="vi-VN" sz="2400" dirty="0" smtClean="0"/>
+              <a:t>\pagestyle{fancy} Khai báo page style của gói vừa khai báo</a:t>
+            </a:r>
+          </a:p>
+          <a:p>
+            <a:r>
+              <a:rPr lang="vi-VN" sz="2400" dirty="0" smtClean="0"/>
+              <a:t>\rhead{Nội dung} tiêu đề góc trên bên phải</a:t>
+            </a:r>
+          </a:p>
+          <a:p>
+            <a:r>
+              <a:rPr lang="vi-VN" sz="2400" dirty="0" smtClean="0"/>
+              <a:t>\lhead{Nội dung} Tiêu đề góc trên bên trái</a:t>
+            </a:r>
+          </a:p>
+          <a:p>
+            <a:r>
+              <a:rPr lang="vi-VN" sz="2400" dirty="0" smtClean="0"/>
+              <a:t>\rfoot{Nội dung}  Tiêu đề góc chân bên phải</a:t>
+            </a:r>
+          </a:p>
+          <a:p>
+            <a:r>
+              <a:rPr lang="vi-VN" sz="2400" dirty="0" smtClean="0"/>
+              <a:t>\thepage Số trang</a:t>
+            </a:r>
+            <a:endParaRPr lang="vi-VN" sz="2400" dirty="0"/>
+          </a:p>
+        </p:txBody>
+      </p:sp>
+    </p:spTree>
+    <p:extLst>
+      <p:ext uri="{BB962C8B-B14F-4D97-AF65-F5344CB8AC3E}">
+        <p14:creationId xmlns:p14="http://schemas.microsoft.com/office/powerpoint/2010/main" val="344507058"/>
+      </p:ext>
+    </p:extLst>
+  </p:cSld>
+  <p:clrMapOvr>
+    <a:masterClrMapping/>
+  </p:clrMapOvr>
+</p:sld>
+</file>
+
+<file path=ppt/slides/slide29.xml><?xml version="1.0" encoding="utf-8"?>
+<p:sld xmlns:a="http://schemas.openxmlformats.org/drawingml/2006/main" xmlns:r="http://schemas.openxmlformats.org/officeDocument/2006/relationships" xmlns:p="http://schemas.openxmlformats.org/presentationml/2006/main">
+  <p:cSld>
+    <p:spTree>
+      <p:nvGrpSpPr>
+        <p:cNvPr id="1" name=""/>
+        <p:cNvGrpSpPr/>
+        <p:nvPr/>
+      </p:nvGrpSpPr>
+      <p:grpSpPr>
+        <a:xfrm>
+          <a:off x="0" y="0"/>
+          <a:ext cx="0" cy="0"/>
+          <a:chOff x="0" y="0"/>
+          <a:chExt cx="0" cy="0"/>
+        </a:xfrm>
+      </p:grpSpPr>
+      <p:sp>
+        <p:nvSpPr>
+          <p:cNvPr id="2" name="Title 1"/>
+          <p:cNvSpPr>
+            <a:spLocks noGrp="1"/>
+          </p:cNvSpPr>
+          <p:nvPr>
+            <p:ph type="title"/>
+          </p:nvPr>
+        </p:nvSpPr>
+        <p:spPr>
+          <a:xfrm>
+            <a:off x="793244" y="493690"/>
             <a:ext cx="8596668" cy="1320800"/>
           </a:xfrm>
         </p:spPr>
@@ -8799,123 +9289,43 @@
           <a:lstStyle/>
           <a:p>
             <a:r>
-              <a:rPr lang="en-US" dirty="0" err="1" smtClean="0"/>
-              <a:t>Tài</a:t>
-            </a:r>
-            <a:r>
-              <a:rPr lang="en-US" dirty="0" smtClean="0"/>
-              <a:t> </a:t>
-            </a:r>
-            <a:r>
-              <a:rPr lang="en-US" dirty="0" err="1" smtClean="0"/>
-              <a:t>liệu</a:t>
-            </a:r>
-            <a:r>
-              <a:rPr lang="en-US" dirty="0" smtClean="0"/>
-              <a:t> </a:t>
-            </a:r>
-            <a:r>
-              <a:rPr lang="en-US" dirty="0" err="1" smtClean="0"/>
-              <a:t>tham</a:t>
-            </a:r>
-            <a:r>
-              <a:rPr lang="en-US" dirty="0" smtClean="0"/>
-              <a:t> </a:t>
-            </a:r>
-            <a:r>
-              <a:rPr lang="en-US" dirty="0" err="1" smtClean="0"/>
-              <a:t>khảo</a:t>
-            </a:r>
-            <a:r>
-              <a:rPr lang="en-US" dirty="0" smtClean="0"/>
-              <a:t>: </a:t>
+              <a:rPr lang="vi-VN" dirty="0" smtClean="0"/>
+              <a:t>VÍ DỤ</a:t>
             </a:r>
             <a:endParaRPr lang="vi-VN" dirty="0"/>
           </a:p>
         </p:txBody>
       </p:sp>
-      <p:sp>
-        <p:nvSpPr>
-          <p:cNvPr id="3" name="Content Placeholder 2"/>
-          <p:cNvSpPr>
-            <a:spLocks noGrp="1"/>
-          </p:cNvSpPr>
+      <p:pic>
+        <p:nvPicPr>
+          <p:cNvPr id="6" name="Content Placeholder 5"/>
+          <p:cNvPicPr>
+            <a:picLocks noGrp="1" noChangeAspect="1"/>
+          </p:cNvPicPr>
           <p:nvPr>
             <p:ph idx="1"/>
           </p:nvPr>
-        </p:nvSpPr>
+        </p:nvPicPr>
+        <p:blipFill>
+          <a:blip r:embed="rId2"/>
+          <a:stretch>
+            <a:fillRect/>
+          </a:stretch>
+        </p:blipFill>
         <p:spPr>
           <a:xfrm>
-            <a:off x="691426" y="2469682"/>
-            <a:ext cx="8596668" cy="3880773"/>
+            <a:off x="3189744" y="493690"/>
+            <a:ext cx="5437271" cy="5547418"/>
           </a:xfrm>
+          <a:prstGeom prst="rect">
+            <a:avLst/>
+          </a:prstGeom>
         </p:spPr>
-        <p:txBody>
-          <a:bodyPr>
-            <a:normAutofit/>
-          </a:bodyPr>
-          <a:lstStyle/>
-          <a:p>
-            <a:r>
-              <a:rPr lang="vi-VN" sz="2800" i="1" dirty="0">
-                <a:hlinkClick r:id="rId2"/>
-              </a:rPr>
-              <a:t>https://</a:t>
-            </a:r>
-            <a:r>
-              <a:rPr lang="vi-VN" sz="2800" i="1" dirty="0" smtClean="0">
-                <a:hlinkClick r:id="rId2"/>
-              </a:rPr>
-              <a:t>www.overleaf.com/learn/latex/Creating_a_document_in_LaTeX</a:t>
-            </a:r>
-            <a:endParaRPr lang="en-US" sz="2800" i="1" dirty="0" smtClean="0"/>
-          </a:p>
-          <a:p>
-            <a:r>
-              <a:rPr lang="vi-VN" sz="2800" i="1" u="sng" dirty="0">
-                <a:solidFill>
-                  <a:srgbClr val="92D050"/>
-                </a:solidFill>
-                <a:hlinkClick r:id="rId3"/>
-              </a:rPr>
-              <a:t>https://phamanhvinh.wordpress.com/2017/04/10/latex-bai-1-soan-thao-trong-latex</a:t>
-            </a:r>
-            <a:r>
-              <a:rPr lang="vi-VN" sz="2800" i="1" u="sng" dirty="0" smtClean="0">
-                <a:solidFill>
-                  <a:srgbClr val="92D050"/>
-                </a:solidFill>
-                <a:hlinkClick r:id="rId3"/>
-              </a:rPr>
-              <a:t>/</a:t>
-            </a:r>
-            <a:endParaRPr lang="vi-VN" sz="2800" i="1" u="sng" dirty="0" smtClean="0">
-              <a:solidFill>
-                <a:srgbClr val="92D050"/>
-              </a:solidFill>
-            </a:endParaRPr>
-          </a:p>
-          <a:p>
-            <a:r>
-              <a:rPr lang="vi-VN" sz="2800" i="1" u="sng" dirty="0">
-                <a:solidFill>
-                  <a:srgbClr val="92D050"/>
-                </a:solidFill>
-              </a:rPr>
-              <a:t>https://blogchiasekienthuc.com/thu-thuat-hay/soan-thao-van-ban-voi-latex.html</a:t>
-            </a:r>
-            <a:endParaRPr lang="vi-VN" sz="2800" i="1" u="sng" dirty="0">
-              <a:solidFill>
-                <a:srgbClr val="92D050"/>
-              </a:solidFill>
-            </a:endParaRPr>
-          </a:p>
-        </p:txBody>
-      </p:sp>
+      </p:pic>
     </p:spTree>
     <p:extLst>
       <p:ext uri="{BB962C8B-B14F-4D97-AF65-F5344CB8AC3E}">
-        <p14:creationId xmlns:p14="http://schemas.microsoft.com/office/powerpoint/2010/main" val="3225512596"/>
+        <p14:creationId xmlns:p14="http://schemas.microsoft.com/office/powerpoint/2010/main" val="1135429753"/>
       </p:ext>
     </p:extLst>
   </p:cSld>
@@ -9058,6 +9468,290 @@
       </p:par>
     </p:tnLst>
   </p:timing>
+</p:sld>
+</file>
+
+<file path=ppt/slides/slide30.xml><?xml version="1.0" encoding="utf-8"?>
+<p:sld xmlns:a="http://schemas.openxmlformats.org/drawingml/2006/main" xmlns:r="http://schemas.openxmlformats.org/officeDocument/2006/relationships" xmlns:p="http://schemas.openxmlformats.org/presentationml/2006/main">
+  <p:cSld>
+    <p:spTree>
+      <p:nvGrpSpPr>
+        <p:cNvPr id="1" name=""/>
+        <p:cNvGrpSpPr/>
+        <p:nvPr/>
+      </p:nvGrpSpPr>
+      <p:grpSpPr>
+        <a:xfrm>
+          <a:off x="0" y="0"/>
+          <a:ext cx="0" cy="0"/>
+          <a:chOff x="0" y="0"/>
+          <a:chExt cx="0" cy="0"/>
+        </a:xfrm>
+      </p:grpSpPr>
+      <p:pic>
+        <p:nvPicPr>
+          <p:cNvPr id="4" name="Picture 3"/>
+          <p:cNvPicPr>
+            <a:picLocks noChangeAspect="1"/>
+          </p:cNvPicPr>
+          <p:nvPr/>
+        </p:nvPicPr>
+        <p:blipFill>
+          <a:blip r:embed="rId2"/>
+          <a:stretch>
+            <a:fillRect/>
+          </a:stretch>
+        </p:blipFill>
+        <p:spPr>
+          <a:xfrm>
+            <a:off x="2704564" y="267940"/>
+            <a:ext cx="4211392" cy="6209656"/>
+          </a:xfrm>
+          <a:prstGeom prst="rect">
+            <a:avLst/>
+          </a:prstGeom>
+        </p:spPr>
+      </p:pic>
+    </p:spTree>
+    <p:extLst>
+      <p:ext uri="{BB962C8B-B14F-4D97-AF65-F5344CB8AC3E}">
+        <p14:creationId xmlns:p14="http://schemas.microsoft.com/office/powerpoint/2010/main" val="3734635239"/>
+      </p:ext>
+    </p:extLst>
+  </p:cSld>
+  <p:clrMapOvr>
+    <a:masterClrMapping/>
+  </p:clrMapOvr>
+</p:sld>
+</file>
+
+<file path=ppt/slides/slide31.xml><?xml version="1.0" encoding="utf-8"?>
+<p:sld xmlns:a="http://schemas.openxmlformats.org/drawingml/2006/main" xmlns:r="http://schemas.openxmlformats.org/officeDocument/2006/relationships" xmlns:p="http://schemas.openxmlformats.org/presentationml/2006/main">
+  <p:cSld>
+    <p:spTree>
+      <p:nvGrpSpPr>
+        <p:cNvPr id="1" name=""/>
+        <p:cNvGrpSpPr/>
+        <p:nvPr/>
+      </p:nvGrpSpPr>
+      <p:grpSpPr>
+        <a:xfrm>
+          <a:off x="0" y="0"/>
+          <a:ext cx="0" cy="0"/>
+          <a:chOff x="0" y="0"/>
+          <a:chExt cx="0" cy="0"/>
+        </a:xfrm>
+      </p:grpSpPr>
+      <p:sp>
+        <p:nvSpPr>
+          <p:cNvPr id="3" name="Content Placeholder 2"/>
+          <p:cNvSpPr>
+            <a:spLocks noGrp="1"/>
+          </p:cNvSpPr>
+          <p:nvPr>
+            <p:ph idx="1"/>
+          </p:nvPr>
+        </p:nvSpPr>
+        <p:spPr>
+          <a:xfrm>
+            <a:off x="156346" y="2624229"/>
+            <a:ext cx="9638643" cy="3880773"/>
+          </a:xfrm>
+        </p:spPr>
+        <p:txBody>
+          <a:bodyPr>
+            <a:normAutofit/>
+          </a:bodyPr>
+          <a:lstStyle/>
+          <a:p>
+            <a:pPr marL="0" indent="0" algn="ctr">
+              <a:buNone/>
+            </a:pPr>
+            <a:r>
+              <a:rPr lang="vi-VN" sz="5400" b="1" dirty="0" smtClean="0">
+                <a:solidFill>
+                  <a:srgbClr val="92D050"/>
+                </a:solidFill>
+              </a:rPr>
+              <a:t>CÁM ƠN CÁC BẠN ĐÃ THEO DÕI BUỔI HỌC</a:t>
+            </a:r>
+            <a:endParaRPr lang="vi-VN" sz="5400" b="1" dirty="0">
+              <a:solidFill>
+                <a:srgbClr val="92D050"/>
+              </a:solidFill>
+            </a:endParaRPr>
+          </a:p>
+        </p:txBody>
+      </p:sp>
+    </p:spTree>
+    <p:extLst>
+      <p:ext uri="{BB962C8B-B14F-4D97-AF65-F5344CB8AC3E}">
+        <p14:creationId xmlns:p14="http://schemas.microsoft.com/office/powerpoint/2010/main" val="1985995013"/>
+      </p:ext>
+    </p:extLst>
+  </p:cSld>
+  <p:clrMapOvr>
+    <a:masterClrMapping/>
+  </p:clrMapOvr>
+</p:sld>
+</file>
+
+<file path=ppt/slides/slide32.xml><?xml version="1.0" encoding="utf-8"?>
+<p:sld xmlns:a="http://schemas.openxmlformats.org/drawingml/2006/main" xmlns:r="http://schemas.openxmlformats.org/officeDocument/2006/relationships" xmlns:p="http://schemas.openxmlformats.org/presentationml/2006/main">
+  <p:cSld>
+    <p:spTree>
+      <p:nvGrpSpPr>
+        <p:cNvPr id="1" name=""/>
+        <p:cNvGrpSpPr/>
+        <p:nvPr/>
+      </p:nvGrpSpPr>
+      <p:grpSpPr>
+        <a:xfrm>
+          <a:off x="0" y="0"/>
+          <a:ext cx="0" cy="0"/>
+          <a:chOff x="0" y="0"/>
+          <a:chExt cx="0" cy="0"/>
+        </a:xfrm>
+      </p:grpSpPr>
+      <p:sp>
+        <p:nvSpPr>
+          <p:cNvPr id="2" name="Title 1"/>
+          <p:cNvSpPr>
+            <a:spLocks noGrp="1"/>
+          </p:cNvSpPr>
+          <p:nvPr>
+            <p:ph type="title"/>
+          </p:nvPr>
+        </p:nvSpPr>
+        <p:spPr>
+          <a:xfrm>
+            <a:off x="691426" y="738389"/>
+            <a:ext cx="8596668" cy="1320800"/>
+          </a:xfrm>
+        </p:spPr>
+        <p:txBody>
+          <a:bodyPr/>
+          <a:lstStyle/>
+          <a:p>
+            <a:r>
+              <a:rPr lang="en-US" dirty="0" err="1" smtClean="0"/>
+              <a:t>Tài</a:t>
+            </a:r>
+            <a:r>
+              <a:rPr lang="en-US" dirty="0" smtClean="0"/>
+              <a:t> </a:t>
+            </a:r>
+            <a:r>
+              <a:rPr lang="en-US" dirty="0" err="1" smtClean="0"/>
+              <a:t>liệu</a:t>
+            </a:r>
+            <a:r>
+              <a:rPr lang="en-US" dirty="0" smtClean="0"/>
+              <a:t> </a:t>
+            </a:r>
+            <a:r>
+              <a:rPr lang="en-US" dirty="0" err="1" smtClean="0"/>
+              <a:t>tham</a:t>
+            </a:r>
+            <a:r>
+              <a:rPr lang="en-US" dirty="0" smtClean="0"/>
+              <a:t> </a:t>
+            </a:r>
+            <a:r>
+              <a:rPr lang="en-US" dirty="0" err="1" smtClean="0"/>
+              <a:t>khảo</a:t>
+            </a:r>
+            <a:r>
+              <a:rPr lang="en-US" dirty="0" smtClean="0"/>
+              <a:t>: </a:t>
+            </a:r>
+            <a:endParaRPr lang="vi-VN" dirty="0"/>
+          </a:p>
+        </p:txBody>
+      </p:sp>
+      <p:sp>
+        <p:nvSpPr>
+          <p:cNvPr id="3" name="Content Placeholder 2"/>
+          <p:cNvSpPr>
+            <a:spLocks noGrp="1"/>
+          </p:cNvSpPr>
+          <p:nvPr>
+            <p:ph idx="1"/>
+          </p:nvPr>
+        </p:nvSpPr>
+        <p:spPr>
+          <a:xfrm>
+            <a:off x="691426" y="2469682"/>
+            <a:ext cx="8596668" cy="3880773"/>
+          </a:xfrm>
+        </p:spPr>
+        <p:txBody>
+          <a:bodyPr>
+            <a:normAutofit/>
+          </a:bodyPr>
+          <a:lstStyle/>
+          <a:p>
+            <a:r>
+              <a:rPr lang="vi-VN" sz="2800" i="1" dirty="0">
+                <a:hlinkClick r:id="rId2"/>
+              </a:rPr>
+              <a:t>https://</a:t>
+            </a:r>
+            <a:r>
+              <a:rPr lang="vi-VN" sz="2800" i="1" dirty="0" smtClean="0">
+                <a:hlinkClick r:id="rId2"/>
+              </a:rPr>
+              <a:t>www.overleaf.com/learn/latex/Creating_a_document_in_LaTeX</a:t>
+            </a:r>
+            <a:endParaRPr lang="en-US" sz="2800" i="1" dirty="0" smtClean="0"/>
+          </a:p>
+          <a:p>
+            <a:r>
+              <a:rPr lang="vi-VN" sz="2800" i="1" u="sng" dirty="0">
+                <a:solidFill>
+                  <a:srgbClr val="92D050"/>
+                </a:solidFill>
+                <a:hlinkClick r:id="rId3"/>
+              </a:rPr>
+              <a:t>https://phamanhvinh.wordpress.com/2017/04/10/latex-bai-1-soan-thao-trong-latex</a:t>
+            </a:r>
+            <a:r>
+              <a:rPr lang="vi-VN" sz="2800" i="1" u="sng" dirty="0" smtClean="0">
+                <a:solidFill>
+                  <a:srgbClr val="92D050"/>
+                </a:solidFill>
+                <a:hlinkClick r:id="rId3"/>
+              </a:rPr>
+              <a:t>/</a:t>
+            </a:r>
+            <a:endParaRPr lang="vi-VN" sz="2800" i="1" u="sng" dirty="0" smtClean="0">
+              <a:solidFill>
+                <a:srgbClr val="92D050"/>
+              </a:solidFill>
+            </a:endParaRPr>
+          </a:p>
+          <a:p>
+            <a:r>
+              <a:rPr lang="vi-VN" sz="2800" i="1" u="sng" dirty="0">
+                <a:solidFill>
+                  <a:srgbClr val="92D050"/>
+                </a:solidFill>
+              </a:rPr>
+              <a:t>https://blogchiasekienthuc.com/thu-thuat-hay/soan-thao-van-ban-voi-latex.html</a:t>
+            </a:r>
+          </a:p>
+        </p:txBody>
+      </p:sp>
+    </p:spTree>
+    <p:extLst>
+      <p:ext uri="{BB962C8B-B14F-4D97-AF65-F5344CB8AC3E}">
+        <p14:creationId xmlns:p14="http://schemas.microsoft.com/office/powerpoint/2010/main" val="3225512596"/>
+      </p:ext>
+    </p:extLst>
+  </p:cSld>
+  <p:clrMapOvr>
+    <a:masterClrMapping/>
+  </p:clrMapOvr>
 </p:sld>
 </file>
 

</xml_diff>

<commit_message>
cap nhat bai 1
</commit_message>
<xml_diff>
--- a/Bài 1/LATEX CƠ BẢN - Bài 1.pptx
+++ b/Bài 1/LATEX CƠ BẢN - Bài 1.pptx
@@ -8517,11 +8517,7 @@
             </a:pPr>
             <a:r>
               <a:rPr lang="vi-VN" dirty="0" smtClean="0"/>
-              <a:t>\author{Hubert Farnsworth \</a:t>
-            </a:r>
-            <a:r>
-              <a:rPr lang="vi-VN" dirty="0" smtClean="0"/>
-              <a:t>thanks{</a:t>
+              <a:t>\author{Hubert Farnsworth \thanks{</a:t>
             </a:r>
             <a:r>
               <a:rPr lang="en-US" dirty="0" err="1" smtClean="0"/>
@@ -8823,7 +8819,6 @@
               <a:rPr lang="vi-VN" dirty="0"/>
               <a:t>\pagestyle{kiểu}</a:t>
             </a:r>
-            <a:endParaRPr lang="vi-VN" dirty="0"/>
           </a:p>
         </p:txBody>
       </p:sp>
@@ -9860,7 +9855,7 @@
           <a:p>
             <a:r>
               <a:rPr lang="en-US" sz="4800" dirty="0" smtClean="0"/>
-              <a:t>LATEX LÀ GÌ?</a:t>
+              <a:t>SƠ LƯỢC LATEX</a:t>
             </a:r>
             <a:endParaRPr lang="vi-VN" sz="4800" dirty="0"/>
           </a:p>

</xml_diff>